<commit_message>
Modify up to chaper 5
</commit_message>
<xml_diff>
--- a/figure/figure.pptx
+++ b/figure/figure.pptx
@@ -28,6 +28,7 @@
     <p:sldId id="277" r:id="rId22"/>
     <p:sldId id="278" r:id="rId23"/>
     <p:sldId id="279" r:id="rId24"/>
+    <p:sldId id="280" r:id="rId25"/>
   </p:sldIdLst>
   <p:sldSz cx="9144000" cy="6858000" type="screen4x3"/>
   <p:notesSz cx="6858000" cy="9144000"/>
@@ -928,11 +929,11 @@
           <c:showPercent val="0"/>
           <c:showBubbleSize val="0"/>
         </c:dLbls>
-        <c:axId val="-23681072"/>
-        <c:axId val="-23682160"/>
+        <c:axId val="-1136476896"/>
+        <c:axId val="-1136463840"/>
       </c:scatterChart>
       <c:valAx>
-        <c:axId val="-23681072"/>
+        <c:axId val="-1136476896"/>
         <c:scaling>
           <c:orientation val="minMax"/>
         </c:scaling>
@@ -942,12 +943,12 @@
         <c:majorTickMark val="none"/>
         <c:minorTickMark val="none"/>
         <c:tickLblPos val="nextTo"/>
-        <c:crossAx val="-23682160"/>
+        <c:crossAx val="-1136463840"/>
         <c:crosses val="autoZero"/>
         <c:crossBetween val="midCat"/>
       </c:valAx>
       <c:valAx>
-        <c:axId val="-23682160"/>
+        <c:axId val="-1136463840"/>
         <c:scaling>
           <c:orientation val="minMax"/>
         </c:scaling>
@@ -957,7 +958,7 @@
         <c:majorTickMark val="none"/>
         <c:minorTickMark val="none"/>
         <c:tickLblPos val="nextTo"/>
-        <c:crossAx val="-23681072"/>
+        <c:crossAx val="-1136476896"/>
         <c:crosses val="autoZero"/>
         <c:crossBetween val="midCat"/>
       </c:valAx>
@@ -2976,11 +2977,11 @@
           <c:showPercent val="0"/>
           <c:showBubbleSize val="0"/>
         </c:dLbls>
-        <c:axId val="-23703920"/>
-        <c:axId val="-23676720"/>
+        <c:axId val="-1136464928"/>
+        <c:axId val="-1136432832"/>
       </c:scatterChart>
       <c:valAx>
-        <c:axId val="-23703920"/>
+        <c:axId val="-1136464928"/>
         <c:scaling>
           <c:orientation val="minMax"/>
         </c:scaling>
@@ -3053,12 +3054,12 @@
         <c:majorTickMark val="none"/>
         <c:minorTickMark val="none"/>
         <c:tickLblPos val="nextTo"/>
-        <c:crossAx val="-23676720"/>
+        <c:crossAx val="-1136432832"/>
         <c:crosses val="autoZero"/>
         <c:crossBetween val="midCat"/>
       </c:valAx>
       <c:valAx>
-        <c:axId val="-23676720"/>
+        <c:axId val="-1136432832"/>
         <c:scaling>
           <c:orientation val="minMax"/>
         </c:scaling>
@@ -3124,7 +3125,7 @@
         <c:majorTickMark val="none"/>
         <c:minorTickMark val="none"/>
         <c:tickLblPos val="nextTo"/>
-        <c:crossAx val="-23703920"/>
+        <c:crossAx val="-1136464928"/>
         <c:crosses val="autoZero"/>
         <c:crossBetween val="midCat"/>
       </c:valAx>
@@ -6865,11 +6866,11 @@
           <c:showPercent val="0"/>
           <c:showBubbleSize val="0"/>
         </c:dLbls>
-        <c:axId val="-1460520112"/>
-        <c:axId val="-1460527728"/>
+        <c:axId val="-1136438816"/>
+        <c:axId val="-1136431744"/>
       </c:scatterChart>
       <c:valAx>
-        <c:axId val="-1460520112"/>
+        <c:axId val="-1136438816"/>
         <c:scaling>
           <c:orientation val="minMax"/>
         </c:scaling>
@@ -6878,12 +6879,12 @@
         <c:majorTickMark val="none"/>
         <c:minorTickMark val="none"/>
         <c:tickLblPos val="nextTo"/>
-        <c:crossAx val="-1460527728"/>
+        <c:crossAx val="-1136431744"/>
         <c:crosses val="autoZero"/>
         <c:crossBetween val="midCat"/>
       </c:valAx>
       <c:valAx>
-        <c:axId val="-1460527728"/>
+        <c:axId val="-1136431744"/>
         <c:scaling>
           <c:orientation val="minMax"/>
         </c:scaling>
@@ -6893,7 +6894,7 @@
         <c:majorTickMark val="none"/>
         <c:minorTickMark val="none"/>
         <c:tickLblPos val="nextTo"/>
-        <c:crossAx val="-1460520112"/>
+        <c:crossAx val="-1136438816"/>
         <c:crosses val="autoZero"/>
         <c:crossBetween val="midCat"/>
       </c:valAx>
@@ -10594,11 +10595,11 @@
           <c:showPercent val="0"/>
           <c:showBubbleSize val="0"/>
         </c:dLbls>
-        <c:axId val="-1299784864"/>
-        <c:axId val="-1299776160"/>
+        <c:axId val="-1136438272"/>
+        <c:axId val="-1136444800"/>
       </c:scatterChart>
       <c:valAx>
-        <c:axId val="-1299784864"/>
+        <c:axId val="-1136438272"/>
         <c:scaling>
           <c:orientation val="minMax"/>
         </c:scaling>
@@ -10607,12 +10608,12 @@
         <c:majorTickMark val="none"/>
         <c:minorTickMark val="none"/>
         <c:tickLblPos val="nextTo"/>
-        <c:crossAx val="-1299776160"/>
+        <c:crossAx val="-1136444800"/>
         <c:crosses val="autoZero"/>
         <c:crossBetween val="midCat"/>
       </c:valAx>
       <c:valAx>
-        <c:axId val="-1299776160"/>
+        <c:axId val="-1136444800"/>
         <c:scaling>
           <c:orientation val="minMax"/>
         </c:scaling>
@@ -10622,7 +10623,7 @@
         <c:majorTickMark val="none"/>
         <c:minorTickMark val="none"/>
         <c:tickLblPos val="nextTo"/>
-        <c:crossAx val="-1299784864"/>
+        <c:crossAx val="-1136438272"/>
         <c:crosses val="autoZero"/>
         <c:crossBetween val="midCat"/>
       </c:valAx>
@@ -14322,11 +14323,11 @@
           <c:showPercent val="0"/>
           <c:showBubbleSize val="0"/>
         </c:dLbls>
-        <c:axId val="-1460519568"/>
-        <c:axId val="-1460508144"/>
+        <c:axId val="-1136437728"/>
+        <c:axId val="-1136444256"/>
       </c:scatterChart>
       <c:valAx>
-        <c:axId val="-1460519568"/>
+        <c:axId val="-1136437728"/>
         <c:scaling>
           <c:orientation val="minMax"/>
         </c:scaling>
@@ -14335,12 +14336,12 @@
         <c:majorTickMark val="none"/>
         <c:minorTickMark val="none"/>
         <c:tickLblPos val="nextTo"/>
-        <c:crossAx val="-1460508144"/>
+        <c:crossAx val="-1136444256"/>
         <c:crosses val="autoZero"/>
         <c:crossBetween val="midCat"/>
       </c:valAx>
       <c:valAx>
-        <c:axId val="-1460508144"/>
+        <c:axId val="-1136444256"/>
         <c:scaling>
           <c:orientation val="minMax"/>
         </c:scaling>
@@ -14350,7 +14351,7 @@
         <c:majorTickMark val="none"/>
         <c:minorTickMark val="none"/>
         <c:tickLblPos val="nextTo"/>
-        <c:crossAx val="-1460519568"/>
+        <c:crossAx val="-1136437728"/>
         <c:crosses val="autoZero"/>
         <c:crossBetween val="midCat"/>
       </c:valAx>
@@ -18050,11 +18051,11 @@
           <c:showPercent val="0"/>
           <c:showBubbleSize val="0"/>
         </c:dLbls>
-        <c:axId val="-26777392"/>
-        <c:axId val="-26790992"/>
+        <c:axId val="-1136433920"/>
+        <c:axId val="-1136429024"/>
       </c:scatterChart>
       <c:valAx>
-        <c:axId val="-26777392"/>
+        <c:axId val="-1136433920"/>
         <c:scaling>
           <c:orientation val="minMax"/>
         </c:scaling>
@@ -18063,12 +18064,12 @@
         <c:majorTickMark val="none"/>
         <c:minorTickMark val="none"/>
         <c:tickLblPos val="nextTo"/>
-        <c:crossAx val="-26790992"/>
+        <c:crossAx val="-1136429024"/>
         <c:crosses val="autoZero"/>
         <c:crossBetween val="midCat"/>
       </c:valAx>
       <c:valAx>
-        <c:axId val="-26790992"/>
+        <c:axId val="-1136429024"/>
         <c:scaling>
           <c:orientation val="minMax"/>
         </c:scaling>
@@ -18078,7 +18079,7 @@
         <c:majorTickMark val="none"/>
         <c:minorTickMark val="none"/>
         <c:tickLblPos val="nextTo"/>
-        <c:crossAx val="-26777392"/>
+        <c:crossAx val="-1136433920"/>
         <c:crosses val="autoZero"/>
         <c:crossBetween val="midCat"/>
       </c:valAx>
@@ -21679,7 +21680,7 @@
           <a:p>
             <a:fld id="{09CD47BF-6BD4-4B77-B555-02EF80936F4A}" type="datetimeFigureOut">
               <a:rPr kumimoji="1" lang="ja-JP" altLang="en-US" smtClean="0"/>
-              <a:t>2019/1/7</a:t>
+              <a:t>2019/1/9</a:t>
             </a:fld>
             <a:endParaRPr kumimoji="1" lang="ja-JP" altLang="en-US"/>
           </a:p>
@@ -21881,7 +21882,7 @@
           <a:p>
             <a:fld id="{09CD47BF-6BD4-4B77-B555-02EF80936F4A}" type="datetimeFigureOut">
               <a:rPr kumimoji="1" lang="ja-JP" altLang="en-US" smtClean="0"/>
-              <a:t>2019/1/7</a:t>
+              <a:t>2019/1/9</a:t>
             </a:fld>
             <a:endParaRPr kumimoji="1" lang="ja-JP" altLang="en-US"/>
           </a:p>
@@ -22093,7 +22094,7 @@
           <a:p>
             <a:fld id="{09CD47BF-6BD4-4B77-B555-02EF80936F4A}" type="datetimeFigureOut">
               <a:rPr kumimoji="1" lang="ja-JP" altLang="en-US" smtClean="0"/>
-              <a:t>2019/1/7</a:t>
+              <a:t>2019/1/9</a:t>
             </a:fld>
             <a:endParaRPr kumimoji="1" lang="ja-JP" altLang="en-US"/>
           </a:p>
@@ -22295,7 +22296,7 @@
           <a:p>
             <a:fld id="{09CD47BF-6BD4-4B77-B555-02EF80936F4A}" type="datetimeFigureOut">
               <a:rPr kumimoji="1" lang="ja-JP" altLang="en-US" smtClean="0"/>
-              <a:t>2019/1/7</a:t>
+              <a:t>2019/1/9</a:t>
             </a:fld>
             <a:endParaRPr kumimoji="1" lang="ja-JP" altLang="en-US"/>
           </a:p>
@@ -22539,7 +22540,7 @@
           <a:p>
             <a:fld id="{09CD47BF-6BD4-4B77-B555-02EF80936F4A}" type="datetimeFigureOut">
               <a:rPr kumimoji="1" lang="ja-JP" altLang="en-US" smtClean="0"/>
-              <a:t>2019/1/7</a:t>
+              <a:t>2019/1/9</a:t>
             </a:fld>
             <a:endParaRPr kumimoji="1" lang="ja-JP" altLang="en-US"/>
           </a:p>
@@ -22835,7 +22836,7 @@
           <a:p>
             <a:fld id="{09CD47BF-6BD4-4B77-B555-02EF80936F4A}" type="datetimeFigureOut">
               <a:rPr kumimoji="1" lang="ja-JP" altLang="en-US" smtClean="0"/>
-              <a:t>2019/1/7</a:t>
+              <a:t>2019/1/9</a:t>
             </a:fld>
             <a:endParaRPr kumimoji="1" lang="ja-JP" altLang="en-US"/>
           </a:p>
@@ -23266,7 +23267,7 @@
           <a:p>
             <a:fld id="{09CD47BF-6BD4-4B77-B555-02EF80936F4A}" type="datetimeFigureOut">
               <a:rPr kumimoji="1" lang="ja-JP" altLang="en-US" smtClean="0"/>
-              <a:t>2019/1/7</a:t>
+              <a:t>2019/1/9</a:t>
             </a:fld>
             <a:endParaRPr kumimoji="1" lang="ja-JP" altLang="en-US"/>
           </a:p>
@@ -23384,7 +23385,7 @@
           <a:p>
             <a:fld id="{09CD47BF-6BD4-4B77-B555-02EF80936F4A}" type="datetimeFigureOut">
               <a:rPr kumimoji="1" lang="ja-JP" altLang="en-US" smtClean="0"/>
-              <a:t>2019/1/7</a:t>
+              <a:t>2019/1/9</a:t>
             </a:fld>
             <a:endParaRPr kumimoji="1" lang="ja-JP" altLang="en-US"/>
           </a:p>
@@ -23479,7 +23480,7 @@
           <a:p>
             <a:fld id="{09CD47BF-6BD4-4B77-B555-02EF80936F4A}" type="datetimeFigureOut">
               <a:rPr kumimoji="1" lang="ja-JP" altLang="en-US" smtClean="0"/>
-              <a:t>2019/1/7</a:t>
+              <a:t>2019/1/9</a:t>
             </a:fld>
             <a:endParaRPr kumimoji="1" lang="ja-JP" altLang="en-US"/>
           </a:p>
@@ -23788,7 +23789,7 @@
           <a:p>
             <a:fld id="{09CD47BF-6BD4-4B77-B555-02EF80936F4A}" type="datetimeFigureOut">
               <a:rPr kumimoji="1" lang="ja-JP" altLang="en-US" smtClean="0"/>
-              <a:t>2019/1/7</a:t>
+              <a:t>2019/1/9</a:t>
             </a:fld>
             <a:endParaRPr kumimoji="1" lang="ja-JP" altLang="en-US"/>
           </a:p>
@@ -24045,7 +24046,7 @@
           <a:p>
             <a:fld id="{09CD47BF-6BD4-4B77-B555-02EF80936F4A}" type="datetimeFigureOut">
               <a:rPr kumimoji="1" lang="ja-JP" altLang="en-US" smtClean="0"/>
-              <a:t>2019/1/7</a:t>
+              <a:t>2019/1/9</a:t>
             </a:fld>
             <a:endParaRPr kumimoji="1" lang="ja-JP" altLang="en-US"/>
           </a:p>
@@ -24290,7 +24291,7 @@
           <a:p>
             <a:fld id="{09CD47BF-6BD4-4B77-B555-02EF80936F4A}" type="datetimeFigureOut">
               <a:rPr kumimoji="1" lang="ja-JP" altLang="en-US" smtClean="0"/>
-              <a:t>2019/1/7</a:t>
+              <a:t>2019/1/9</a:t>
             </a:fld>
             <a:endParaRPr kumimoji="1" lang="ja-JP" altLang="en-US"/>
           </a:p>
@@ -25128,7 +25129,7 @@
           <p:cNvPr id="3" name="図 2">
             <a:extLst>
               <a:ext uri="{FF2B5EF4-FFF2-40B4-BE49-F238E27FC236}">
-                <a16:creationId xmlns:a16="http://schemas.microsoft.com/office/drawing/2014/main" xmlns="" id="{B4ED1BF3-90F1-451E-9E90-60F1863EE89F}"/>
+                <a16:creationId xmlns="" xmlns:a16="http://schemas.microsoft.com/office/drawing/2014/main" id="{B4ED1BF3-90F1-451E-9E90-60F1863EE89F}"/>
               </a:ext>
             </a:extLst>
           </p:cNvPr>
@@ -25164,7 +25165,7 @@
           <p:cNvPr id="17" name="図 16">
             <a:extLst>
               <a:ext uri="{FF2B5EF4-FFF2-40B4-BE49-F238E27FC236}">
-                <a16:creationId xmlns:a16="http://schemas.microsoft.com/office/drawing/2014/main" xmlns="" id="{9A308082-45A8-4E3F-BB46-C54665657FA0}"/>
+                <a16:creationId xmlns="" xmlns:a16="http://schemas.microsoft.com/office/drawing/2014/main" id="{9A308082-45A8-4E3F-BB46-C54665657FA0}"/>
               </a:ext>
             </a:extLst>
           </p:cNvPr>
@@ -29180,7 +29181,7 @@
           <p:cNvPr id="92" name="グループ化 91">
             <a:extLst>
               <a:ext uri="{FF2B5EF4-FFF2-40B4-BE49-F238E27FC236}">
-                <a16:creationId xmlns:a16="http://schemas.microsoft.com/office/drawing/2014/main" xmlns="" id="{639BA753-011C-4215-9546-98AC54E2E336}"/>
+                <a16:creationId xmlns="" xmlns:a16="http://schemas.microsoft.com/office/drawing/2014/main" id="{639BA753-011C-4215-9546-98AC54E2E336}"/>
               </a:ext>
             </a:extLst>
           </p:cNvPr>
@@ -29200,7 +29201,7 @@
             <p:cNvPr id="16" name="正方形/長方形 15">
               <a:extLst>
                 <a:ext uri="{FF2B5EF4-FFF2-40B4-BE49-F238E27FC236}">
-                  <a16:creationId xmlns:a16="http://schemas.microsoft.com/office/drawing/2014/main" xmlns="" id="{8864168A-4318-4B2D-A3F8-19DFECEB3821}"/>
+                  <a16:creationId xmlns="" xmlns:a16="http://schemas.microsoft.com/office/drawing/2014/main" id="{8864168A-4318-4B2D-A3F8-19DFECEB3821}"/>
                 </a:ext>
               </a:extLst>
             </p:cNvPr>
@@ -29252,7 +29253,7 @@
             <p:cNvPr id="17" name="グループ化 16">
               <a:extLst>
                 <a:ext uri="{FF2B5EF4-FFF2-40B4-BE49-F238E27FC236}">
-                  <a16:creationId xmlns:a16="http://schemas.microsoft.com/office/drawing/2014/main" xmlns="" id="{BAED9F81-2A5D-4928-B925-6ADB2B6AE58F}"/>
+                  <a16:creationId xmlns="" xmlns:a16="http://schemas.microsoft.com/office/drawing/2014/main" id="{BAED9F81-2A5D-4928-B925-6ADB2B6AE58F}"/>
                 </a:ext>
               </a:extLst>
             </p:cNvPr>
@@ -29272,7 +29273,7 @@
               <p:cNvPr id="18" name="正方形/長方形 17">
                 <a:extLst>
                   <a:ext uri="{FF2B5EF4-FFF2-40B4-BE49-F238E27FC236}">
-                    <a16:creationId xmlns:a16="http://schemas.microsoft.com/office/drawing/2014/main" xmlns="" id="{2C7F989F-3921-4DE0-A764-CEEC7B513E7C}"/>
+                    <a16:creationId xmlns="" xmlns:a16="http://schemas.microsoft.com/office/drawing/2014/main" id="{2C7F989F-3921-4DE0-A764-CEEC7B513E7C}"/>
                   </a:ext>
                 </a:extLst>
               </p:cNvPr>
@@ -29322,7 +29323,7 @@
               <p:cNvPr id="19" name="正方形/長方形 18">
                 <a:extLst>
                   <a:ext uri="{FF2B5EF4-FFF2-40B4-BE49-F238E27FC236}">
-                    <a16:creationId xmlns:a16="http://schemas.microsoft.com/office/drawing/2014/main" xmlns="" id="{9C00BA97-2D81-4FCD-BE5D-E238E91FF3EE}"/>
+                    <a16:creationId xmlns="" xmlns:a16="http://schemas.microsoft.com/office/drawing/2014/main" id="{9C00BA97-2D81-4FCD-BE5D-E238E91FF3EE}"/>
                   </a:ext>
                 </a:extLst>
               </p:cNvPr>
@@ -29372,7 +29373,7 @@
               <p:cNvPr id="20" name="直線矢印コネクタ 19">
                 <a:extLst>
                   <a:ext uri="{FF2B5EF4-FFF2-40B4-BE49-F238E27FC236}">
-                    <a16:creationId xmlns:a16="http://schemas.microsoft.com/office/drawing/2014/main" xmlns="" id="{2273B581-DD99-49B2-AD58-2DCC9EAAF292}"/>
+                    <a16:creationId xmlns="" xmlns:a16="http://schemas.microsoft.com/office/drawing/2014/main" id="{2273B581-DD99-49B2-AD58-2DCC9EAAF292}"/>
                   </a:ext>
                 </a:extLst>
               </p:cNvPr>
@@ -29414,7 +29415,7 @@
               <p:cNvPr id="21" name="直線矢印コネクタ 20">
                 <a:extLst>
                   <a:ext uri="{FF2B5EF4-FFF2-40B4-BE49-F238E27FC236}">
-                    <a16:creationId xmlns:a16="http://schemas.microsoft.com/office/drawing/2014/main" xmlns="" id="{D812CF2E-4041-48B0-971E-7DF04A3605CC}"/>
+                    <a16:creationId xmlns="" xmlns:a16="http://schemas.microsoft.com/office/drawing/2014/main" id="{D812CF2E-4041-48B0-971E-7DF04A3605CC}"/>
                   </a:ext>
                 </a:extLst>
               </p:cNvPr>
@@ -29456,7 +29457,7 @@
               <p:cNvPr id="22" name="直線矢印コネクタ 21">
                 <a:extLst>
                   <a:ext uri="{FF2B5EF4-FFF2-40B4-BE49-F238E27FC236}">
-                    <a16:creationId xmlns:a16="http://schemas.microsoft.com/office/drawing/2014/main" xmlns="" id="{799D31D6-3362-4305-A7A6-C846B3E534C8}"/>
+                    <a16:creationId xmlns="" xmlns:a16="http://schemas.microsoft.com/office/drawing/2014/main" id="{799D31D6-3362-4305-A7A6-C846B3E534C8}"/>
                   </a:ext>
                 </a:extLst>
               </p:cNvPr>
@@ -29498,7 +29499,7 @@
               <p:cNvPr id="23" name="直線矢印コネクタ 22">
                 <a:extLst>
                   <a:ext uri="{FF2B5EF4-FFF2-40B4-BE49-F238E27FC236}">
-                    <a16:creationId xmlns:a16="http://schemas.microsoft.com/office/drawing/2014/main" xmlns="" id="{295F4986-25E5-45D3-A9AC-44B9B5A71DDD}"/>
+                    <a16:creationId xmlns="" xmlns:a16="http://schemas.microsoft.com/office/drawing/2014/main" id="{295F4986-25E5-45D3-A9AC-44B9B5A71DDD}"/>
                   </a:ext>
                 </a:extLst>
               </p:cNvPr>
@@ -29540,7 +29541,7 @@
               <p:cNvPr id="24" name="直線矢印コネクタ 23">
                 <a:extLst>
                   <a:ext uri="{FF2B5EF4-FFF2-40B4-BE49-F238E27FC236}">
-                    <a16:creationId xmlns:a16="http://schemas.microsoft.com/office/drawing/2014/main" xmlns="" id="{3249BBB2-33F1-465A-BC2F-9294F8EDF6CE}"/>
+                    <a16:creationId xmlns="" xmlns:a16="http://schemas.microsoft.com/office/drawing/2014/main" id="{3249BBB2-33F1-465A-BC2F-9294F8EDF6CE}"/>
                   </a:ext>
                 </a:extLst>
               </p:cNvPr>
@@ -29582,7 +29583,7 @@
               <p:cNvPr id="25" name="楕円 24">
                 <a:extLst>
                   <a:ext uri="{FF2B5EF4-FFF2-40B4-BE49-F238E27FC236}">
-                    <a16:creationId xmlns:a16="http://schemas.microsoft.com/office/drawing/2014/main" xmlns="" id="{FDC553D5-2961-4A72-AED9-09CEAD70BA07}"/>
+                    <a16:creationId xmlns="" xmlns:a16="http://schemas.microsoft.com/office/drawing/2014/main" id="{FDC553D5-2961-4A72-AED9-09CEAD70BA07}"/>
                   </a:ext>
                 </a:extLst>
               </p:cNvPr>
@@ -29643,7 +29644,7 @@
           <p:cNvPr id="93" name="グループ化 92">
             <a:extLst>
               <a:ext uri="{FF2B5EF4-FFF2-40B4-BE49-F238E27FC236}">
-                <a16:creationId xmlns:a16="http://schemas.microsoft.com/office/drawing/2014/main" xmlns="" id="{41E3E5B7-68DD-4CCF-8096-80FBE0F93BD1}"/>
+                <a16:creationId xmlns="" xmlns:a16="http://schemas.microsoft.com/office/drawing/2014/main" id="{41E3E5B7-68DD-4CCF-8096-80FBE0F93BD1}"/>
               </a:ext>
             </a:extLst>
           </p:cNvPr>
@@ -29663,7 +29664,7 @@
             <p:cNvPr id="26" name="正方形/長方形 25">
               <a:extLst>
                 <a:ext uri="{FF2B5EF4-FFF2-40B4-BE49-F238E27FC236}">
-                  <a16:creationId xmlns:a16="http://schemas.microsoft.com/office/drawing/2014/main" xmlns="" id="{76F2BD1F-9F3D-464B-A48C-D9B677F9D02D}"/>
+                  <a16:creationId xmlns="" xmlns:a16="http://schemas.microsoft.com/office/drawing/2014/main" id="{76F2BD1F-9F3D-464B-A48C-D9B677F9D02D}"/>
                 </a:ext>
               </a:extLst>
             </p:cNvPr>
@@ -29715,7 +29716,7 @@
             <p:cNvPr id="43" name="グループ化 42">
               <a:extLst>
                 <a:ext uri="{FF2B5EF4-FFF2-40B4-BE49-F238E27FC236}">
-                  <a16:creationId xmlns:a16="http://schemas.microsoft.com/office/drawing/2014/main" xmlns="" id="{EA3DAA7C-E3FA-438F-AC85-5B5E5250BE1C}"/>
+                  <a16:creationId xmlns="" xmlns:a16="http://schemas.microsoft.com/office/drawing/2014/main" id="{EA3DAA7C-E3FA-438F-AC85-5B5E5250BE1C}"/>
                 </a:ext>
               </a:extLst>
             </p:cNvPr>
@@ -29735,7 +29736,7 @@
               <p:cNvPr id="41" name="グループ化 40">
                 <a:extLst>
                   <a:ext uri="{FF2B5EF4-FFF2-40B4-BE49-F238E27FC236}">
-                    <a16:creationId xmlns:a16="http://schemas.microsoft.com/office/drawing/2014/main" xmlns="" id="{F82E4DDD-724A-4416-830C-8FD32173BCB6}"/>
+                    <a16:creationId xmlns="" xmlns:a16="http://schemas.microsoft.com/office/drawing/2014/main" id="{F82E4DDD-724A-4416-830C-8FD32173BCB6}"/>
                   </a:ext>
                 </a:extLst>
               </p:cNvPr>
@@ -29755,7 +29756,7 @@
                 <p:cNvPr id="36" name="部分円 35">
                   <a:extLst>
                     <a:ext uri="{FF2B5EF4-FFF2-40B4-BE49-F238E27FC236}">
-                      <a16:creationId xmlns:a16="http://schemas.microsoft.com/office/drawing/2014/main" xmlns="" id="{CD3CDD07-9846-46D4-86CB-702F6BF7D7EC}"/>
+                      <a16:creationId xmlns="" xmlns:a16="http://schemas.microsoft.com/office/drawing/2014/main" id="{CD3CDD07-9846-46D4-86CB-702F6BF7D7EC}"/>
                     </a:ext>
                   </a:extLst>
                 </p:cNvPr>
@@ -29808,7 +29809,7 @@
                 <p:cNvPr id="38" name="部分円 37">
                   <a:extLst>
                     <a:ext uri="{FF2B5EF4-FFF2-40B4-BE49-F238E27FC236}">
-                      <a16:creationId xmlns:a16="http://schemas.microsoft.com/office/drawing/2014/main" xmlns="" id="{6B7CA300-C034-4E95-A00E-F371B83C538D}"/>
+                      <a16:creationId xmlns="" xmlns:a16="http://schemas.microsoft.com/office/drawing/2014/main" id="{6B7CA300-C034-4E95-A00E-F371B83C538D}"/>
                     </a:ext>
                   </a:extLst>
                 </p:cNvPr>
@@ -29862,7 +29863,7 @@
               <p:cNvPr id="42" name="グループ化 41">
                 <a:extLst>
                   <a:ext uri="{FF2B5EF4-FFF2-40B4-BE49-F238E27FC236}">
-                    <a16:creationId xmlns:a16="http://schemas.microsoft.com/office/drawing/2014/main" xmlns="" id="{D3F6CA07-FF86-42B5-96B1-31E951466979}"/>
+                    <a16:creationId xmlns="" xmlns:a16="http://schemas.microsoft.com/office/drawing/2014/main" id="{D3F6CA07-FF86-42B5-96B1-31E951466979}"/>
                   </a:ext>
                 </a:extLst>
               </p:cNvPr>
@@ -29882,7 +29883,7 @@
                 <p:cNvPr id="37" name="部分円 36">
                   <a:extLst>
                     <a:ext uri="{FF2B5EF4-FFF2-40B4-BE49-F238E27FC236}">
-                      <a16:creationId xmlns:a16="http://schemas.microsoft.com/office/drawing/2014/main" xmlns="" id="{B7E143AE-B5B8-45B8-9C5A-FCBD23BA24B9}"/>
+                      <a16:creationId xmlns="" xmlns:a16="http://schemas.microsoft.com/office/drawing/2014/main" id="{B7E143AE-B5B8-45B8-9C5A-FCBD23BA24B9}"/>
                     </a:ext>
                   </a:extLst>
                 </p:cNvPr>
@@ -29935,7 +29936,7 @@
                 <p:cNvPr id="39" name="部分円 38">
                   <a:extLst>
                     <a:ext uri="{FF2B5EF4-FFF2-40B4-BE49-F238E27FC236}">
-                      <a16:creationId xmlns:a16="http://schemas.microsoft.com/office/drawing/2014/main" xmlns="" id="{8C538B00-E71F-4AB4-86EF-5876C7CE823E}"/>
+                      <a16:creationId xmlns="" xmlns:a16="http://schemas.microsoft.com/office/drawing/2014/main" id="{8C538B00-E71F-4AB4-86EF-5876C7CE823E}"/>
                     </a:ext>
                   </a:extLst>
                 </p:cNvPr>
@@ -29990,7 +29991,7 @@
             <p:cNvPr id="81" name="グループ化 80">
               <a:extLst>
                 <a:ext uri="{FF2B5EF4-FFF2-40B4-BE49-F238E27FC236}">
-                  <a16:creationId xmlns:a16="http://schemas.microsoft.com/office/drawing/2014/main" xmlns="" id="{8BB80246-34AD-41FA-9119-4AD8BCFBB19D}"/>
+                  <a16:creationId xmlns="" xmlns:a16="http://schemas.microsoft.com/office/drawing/2014/main" id="{8BB80246-34AD-41FA-9119-4AD8BCFBB19D}"/>
                 </a:ext>
               </a:extLst>
             </p:cNvPr>
@@ -30010,7 +30011,7 @@
               <p:cNvPr id="77" name="テキスト ボックス 76">
                 <a:extLst>
                   <a:ext uri="{FF2B5EF4-FFF2-40B4-BE49-F238E27FC236}">
-                    <a16:creationId xmlns:a16="http://schemas.microsoft.com/office/drawing/2014/main" xmlns="" id="{F1EA054A-9F35-446F-AA6A-E74FE9990CC6}"/>
+                    <a16:creationId xmlns="" xmlns:a16="http://schemas.microsoft.com/office/drawing/2014/main" id="{F1EA054A-9F35-446F-AA6A-E74FE9990CC6}"/>
                   </a:ext>
                 </a:extLst>
               </p:cNvPr>
@@ -30055,7 +30056,7 @@
               <p:cNvPr id="78" name="テキスト ボックス 77">
                 <a:extLst>
                   <a:ext uri="{FF2B5EF4-FFF2-40B4-BE49-F238E27FC236}">
-                    <a16:creationId xmlns:a16="http://schemas.microsoft.com/office/drawing/2014/main" xmlns="" id="{87DDB165-5DA5-4879-B296-6D62FE5B65EA}"/>
+                    <a16:creationId xmlns="" xmlns:a16="http://schemas.microsoft.com/office/drawing/2014/main" id="{87DDB165-5DA5-4879-B296-6D62FE5B65EA}"/>
                   </a:ext>
                 </a:extLst>
               </p:cNvPr>
@@ -30100,7 +30101,7 @@
               <p:cNvPr id="79" name="テキスト ボックス 78">
                 <a:extLst>
                   <a:ext uri="{FF2B5EF4-FFF2-40B4-BE49-F238E27FC236}">
-                    <a16:creationId xmlns:a16="http://schemas.microsoft.com/office/drawing/2014/main" xmlns="" id="{EA77BD39-1ABC-4581-A60F-894D04743E0C}"/>
+                    <a16:creationId xmlns="" xmlns:a16="http://schemas.microsoft.com/office/drawing/2014/main" id="{EA77BD39-1ABC-4581-A60F-894D04743E0C}"/>
                   </a:ext>
                 </a:extLst>
               </p:cNvPr>
@@ -30145,7 +30146,7 @@
               <p:cNvPr id="80" name="テキスト ボックス 79">
                 <a:extLst>
                   <a:ext uri="{FF2B5EF4-FFF2-40B4-BE49-F238E27FC236}">
-                    <a16:creationId xmlns:a16="http://schemas.microsoft.com/office/drawing/2014/main" xmlns="" id="{BAE0B022-52A7-40A8-9FDA-2EFA0C204936}"/>
+                    <a16:creationId xmlns="" xmlns:a16="http://schemas.microsoft.com/office/drawing/2014/main" id="{BAE0B022-52A7-40A8-9FDA-2EFA0C204936}"/>
                   </a:ext>
                 </a:extLst>
               </p:cNvPr>
@@ -30186,7 +30187,7 @@
             <p:cNvPr id="89" name="グループ化 88">
               <a:extLst>
                 <a:ext uri="{FF2B5EF4-FFF2-40B4-BE49-F238E27FC236}">
-                  <a16:creationId xmlns:a16="http://schemas.microsoft.com/office/drawing/2014/main" xmlns="" id="{909F7A10-B1B9-4384-BD6B-0E435A68DCB7}"/>
+                  <a16:creationId xmlns="" xmlns:a16="http://schemas.microsoft.com/office/drawing/2014/main" id="{909F7A10-B1B9-4384-BD6B-0E435A68DCB7}"/>
                 </a:ext>
               </a:extLst>
             </p:cNvPr>
@@ -30206,7 +30207,7 @@
               <p:cNvPr id="84" name="フリーフォーム: 図形 83">
                 <a:extLst>
                   <a:ext uri="{FF2B5EF4-FFF2-40B4-BE49-F238E27FC236}">
-                    <a16:creationId xmlns:a16="http://schemas.microsoft.com/office/drawing/2014/main" xmlns="" id="{30C3D3C4-B7E7-4497-A120-268F6EDDD681}"/>
+                    <a16:creationId xmlns="" xmlns:a16="http://schemas.microsoft.com/office/drawing/2014/main" id="{30C3D3C4-B7E7-4497-A120-268F6EDDD681}"/>
                   </a:ext>
                 </a:extLst>
               </p:cNvPr>
@@ -30302,7 +30303,7 @@
               <p:cNvPr id="85" name="フリーフォーム: 図形 84">
                 <a:extLst>
                   <a:ext uri="{FF2B5EF4-FFF2-40B4-BE49-F238E27FC236}">
-                    <a16:creationId xmlns:a16="http://schemas.microsoft.com/office/drawing/2014/main" xmlns="" id="{ADEAF19E-4397-4B78-BC08-2CD7957BD7CD}"/>
+                    <a16:creationId xmlns="" xmlns:a16="http://schemas.microsoft.com/office/drawing/2014/main" id="{ADEAF19E-4397-4B78-BC08-2CD7957BD7CD}"/>
                   </a:ext>
                 </a:extLst>
               </p:cNvPr>
@@ -30399,7 +30400,7 @@
               <p:cNvPr id="87" name="フリーフォーム: 図形 86">
                 <a:extLst>
                   <a:ext uri="{FF2B5EF4-FFF2-40B4-BE49-F238E27FC236}">
-                    <a16:creationId xmlns:a16="http://schemas.microsoft.com/office/drawing/2014/main" xmlns="" id="{E1DDB833-4121-4F6F-925D-DD4D5026756D}"/>
+                    <a16:creationId xmlns="" xmlns:a16="http://schemas.microsoft.com/office/drawing/2014/main" id="{E1DDB833-4121-4F6F-925D-DD4D5026756D}"/>
                   </a:ext>
                 </a:extLst>
               </p:cNvPr>
@@ -30496,7 +30497,7 @@
               <p:cNvPr id="88" name="フリーフォーム: 図形 87">
                 <a:extLst>
                   <a:ext uri="{FF2B5EF4-FFF2-40B4-BE49-F238E27FC236}">
-                    <a16:creationId xmlns:a16="http://schemas.microsoft.com/office/drawing/2014/main" xmlns="" id="{8EAC0272-6C94-4AF4-A538-BAB58BD46C6B}"/>
+                    <a16:creationId xmlns="" xmlns:a16="http://schemas.microsoft.com/office/drawing/2014/main" id="{8EAC0272-6C94-4AF4-A538-BAB58BD46C6B}"/>
                   </a:ext>
                 </a:extLst>
               </p:cNvPr>
@@ -30632,10 +30633,10 @@
           <p:cNvPr id="10" name="Rectangle 9">
             <a:extLst>
               <a:ext uri="{FF2B5EF4-FFF2-40B4-BE49-F238E27FC236}">
-                <a16:creationId xmlns:a16="http://schemas.microsoft.com/office/drawing/2014/main" xmlns="" id="{01D0AF59-99C3-4251-AB9A-C966C6AD4400}"/>
+                <a16:creationId xmlns="" xmlns:a16="http://schemas.microsoft.com/office/drawing/2014/main" id="{01D0AF59-99C3-4251-AB9A-C966C6AD4400}"/>
               </a:ext>
               <a:ext uri="{C183D7F6-B498-43B3-948B-1728B52AA6E4}">
-                <adec:decorative xmlns:adec="http://schemas.microsoft.com/office/drawing/2017/decorative" xmlns="" val="1"/>
+                <adec:decorative xmlns="" xmlns:adec="http://schemas.microsoft.com/office/drawing/2017/decorative" val="1"/>
               </a:ext>
             </a:extLst>
           </p:cNvPr>
@@ -30645,7 +30646,7 @@
           <p:nvPr>
             <p:extLst>
               <p:ext uri="{386F3935-93C4-4BCD-93E2-E3B085C9AB24}">
-                <p16:designElem xmlns:p16="http://schemas.microsoft.com/office/powerpoint/2015/main" xmlns="" val="1"/>
+                <p16:designElem xmlns="" xmlns:p16="http://schemas.microsoft.com/office/powerpoint/2015/main" val="1"/>
               </p:ext>
             </p:extLst>
           </p:nvPr>
@@ -30695,10 +30696,10 @@
           <p:cNvPr id="12" name="Rectangle 11">
             <a:extLst>
               <a:ext uri="{FF2B5EF4-FFF2-40B4-BE49-F238E27FC236}">
-                <a16:creationId xmlns:a16="http://schemas.microsoft.com/office/drawing/2014/main" xmlns="" id="{1855405F-37A2-4869-9154-F8BE3BECE6C3}"/>
+                <a16:creationId xmlns="" xmlns:a16="http://schemas.microsoft.com/office/drawing/2014/main" id="{1855405F-37A2-4869-9154-F8BE3BECE6C3}"/>
               </a:ext>
               <a:ext uri="{C183D7F6-B498-43B3-948B-1728B52AA6E4}">
-                <adec:decorative xmlns:adec="http://schemas.microsoft.com/office/drawing/2017/decorative" xmlns="" val="1"/>
+                <adec:decorative xmlns="" xmlns:adec="http://schemas.microsoft.com/office/drawing/2017/decorative" val="1"/>
               </a:ext>
             </a:extLst>
           </p:cNvPr>
@@ -30708,7 +30709,7 @@
           <p:nvPr>
             <p:extLst>
               <p:ext uri="{386F3935-93C4-4BCD-93E2-E3B085C9AB24}">
-                <p16:designElem xmlns:p16="http://schemas.microsoft.com/office/powerpoint/2015/main" xmlns="" val="1"/>
+                <p16:designElem xmlns="" xmlns:p16="http://schemas.microsoft.com/office/powerpoint/2015/main" val="1"/>
               </p:ext>
             </p:extLst>
           </p:nvPr>
@@ -30825,8 +30826,8 @@
               <a:chExt cx="5606929" cy="3600000"/>
             </a:xfrm>
           </p:grpSpPr>
-          <mc:AlternateContent xmlns:mc="http://schemas.openxmlformats.org/markup-compatibility/2006">
-            <mc:Choice xmlns:a14="http://schemas.microsoft.com/office/drawing/2010/main" Requires="a14">
+          <mc:AlternateContent xmlns:mc="http://schemas.openxmlformats.org/markup-compatibility/2006" xmlns:a14="http://schemas.microsoft.com/office/drawing/2010/main">
+            <mc:Choice Requires="a14">
               <p:graphicFrame>
                 <p:nvGraphicFramePr>
                   <p:cNvPr id="9" name="グラフ 8"/>
@@ -30852,7 +30853,7 @@
                 </a:graphic>
               </p:graphicFrame>
             </mc:Choice>
-            <mc:Fallback>
+            <mc:Fallback xmlns="">
               <p:graphicFrame>
                 <p:nvGraphicFramePr>
                   <p:cNvPr id="9" name="グラフ 8"/>
@@ -30873,7 +30874,7 @@
                 </p:xfrm>
                 <a:graphic>
                   <a:graphicData uri="http://schemas.openxmlformats.org/drawingml/2006/chart">
-                    <c:chart xmlns:c="http://schemas.openxmlformats.org/drawingml/2006/chart" xmlns:r="http://schemas.openxmlformats.org/officeDocument/2006/relationships" r:id="rId2"/>
+                    <c:chart xmlns:c="http://schemas.openxmlformats.org/drawingml/2006/chart" xmlns:r="http://schemas.openxmlformats.org/officeDocument/2006/relationships" r:id="rId3"/>
                   </a:graphicData>
                 </a:graphic>
               </p:graphicFrame>
@@ -31239,8 +31240,8 @@
               </a:fontRef>
             </p:style>
           </p:cxnSp>
-          <mc:AlternateContent xmlns:mc="http://schemas.openxmlformats.org/markup-compatibility/2006">
-            <mc:Choice xmlns:a14="http://schemas.microsoft.com/office/drawing/2010/main" Requires="a14">
+          <mc:AlternateContent xmlns:mc="http://schemas.openxmlformats.org/markup-compatibility/2006" xmlns:a14="http://schemas.microsoft.com/office/drawing/2010/main">
+            <mc:Choice Requires="a14">
               <p:sp>
                 <p:nvSpPr>
                   <p:cNvPr id="20" name="テキスト ボックス 19"/>
@@ -31263,6 +31264,7 @@
                   </a:bodyPr>
                   <a:lstStyle/>
                   <a:p>
+                    <a:pPr/>
                     <a14:m>
                       <m:oMathPara xmlns:m="http://schemas.openxmlformats.org/officeDocument/2006/math">
                         <m:oMathParaPr>
@@ -31302,7 +31304,7 @@
                 </p:txBody>
               </p:sp>
             </mc:Choice>
-            <mc:Fallback>
+            <mc:Fallback xmlns="">
               <p:sp>
                 <p:nvSpPr>
                   <p:cNvPr id="20" name="テキスト ボックス 19"/>
@@ -31320,7 +31322,7 @@
                     <a:avLst/>
                   </a:prstGeom>
                   <a:blipFill rotWithShape="0">
-                    <a:blip r:embed="rId3"/>
+                    <a:blip r:embed="rId4"/>
                     <a:stretch>
                       <a:fillRect/>
                     </a:stretch>
@@ -31341,8 +31343,8 @@
               </p:sp>
             </mc:Fallback>
           </mc:AlternateContent>
-          <mc:AlternateContent xmlns:mc="http://schemas.openxmlformats.org/markup-compatibility/2006">
-            <mc:Choice xmlns:a14="http://schemas.microsoft.com/office/drawing/2010/main" Requires="a14">
+          <mc:AlternateContent xmlns:mc="http://schemas.openxmlformats.org/markup-compatibility/2006" xmlns:a14="http://schemas.microsoft.com/office/drawing/2010/main">
+            <mc:Choice Requires="a14">
               <p:sp>
                 <p:nvSpPr>
                   <p:cNvPr id="21" name="テキスト ボックス 20"/>
@@ -31365,6 +31367,7 @@
                   </a:bodyPr>
                   <a:lstStyle/>
                   <a:p>
+                    <a:pPr/>
                     <a14:m>
                       <m:oMathPara xmlns:m="http://schemas.openxmlformats.org/officeDocument/2006/math">
                         <m:oMathParaPr>
@@ -31404,7 +31407,7 @@
                 </p:txBody>
               </p:sp>
             </mc:Choice>
-            <mc:Fallback>
+            <mc:Fallback xmlns="">
               <p:sp>
                 <p:nvSpPr>
                   <p:cNvPr id="21" name="テキスト ボックス 20"/>
@@ -31416,89 +31419,6 @@
                 <p:spPr>
                   <a:xfrm>
                     <a:off x="1531627" y="2350449"/>
-                    <a:ext cx="600395" cy="369332"/>
-                  </a:xfrm>
-                  <a:prstGeom prst="rect">
-                    <a:avLst/>
-                  </a:prstGeom>
-                  <a:blipFill rotWithShape="0">
-                    <a:blip r:embed="rId4"/>
-                    <a:stretch>
-                      <a:fillRect/>
-                    </a:stretch>
-                  </a:blipFill>
-                </p:spPr>
-                <p:txBody>
-                  <a:bodyPr/>
-                  <a:lstStyle/>
-                  <a:p>
-                    <a:r>
-                      <a:rPr lang="ja-JP" altLang="en-US">
-                        <a:noFill/>
-                      </a:rPr>
-                      <a:t> </a:t>
-                    </a:r>
-                  </a:p>
-                </p:txBody>
-              </p:sp>
-            </mc:Fallback>
-          </mc:AlternateContent>
-          <mc:AlternateContent xmlns:mc="http://schemas.openxmlformats.org/markup-compatibility/2006">
-            <mc:Choice xmlns:a14="http://schemas.microsoft.com/office/drawing/2010/main" Requires="a14">
-              <p:sp>
-                <p:nvSpPr>
-                  <p:cNvPr id="22" name="テキスト ボックス 21"/>
-                  <p:cNvSpPr txBox="1"/>
-                  <p:nvPr/>
-                </p:nvSpPr>
-                <p:spPr>
-                  <a:xfrm>
-                    <a:off x="6323277" y="3437765"/>
-                    <a:ext cx="600395" cy="369332"/>
-                  </a:xfrm>
-                  <a:prstGeom prst="rect">
-                    <a:avLst/>
-                  </a:prstGeom>
-                  <a:noFill/>
-                </p:spPr>
-                <p:txBody>
-                  <a:bodyPr wrap="square" rtlCol="0">
-                    <a:spAutoFit/>
-                  </a:bodyPr>
-                  <a:lstStyle/>
-                  <a:p>
-                    <a14:m>
-                      <m:oMathPara xmlns:m="http://schemas.openxmlformats.org/officeDocument/2006/math">
-                        <m:oMathParaPr>
-                          <m:jc m:val="centerGroup"/>
-                        </m:oMathParaPr>
-                        <m:oMath xmlns:m="http://schemas.openxmlformats.org/officeDocument/2006/math">
-                          <m:r>
-                            <a:rPr kumimoji="1" lang="en-US" altLang="ja-JP" b="0" i="1" smtClean="0">
-                              <a:latin typeface="Cambria Math" panose="02040503050406030204" pitchFamily="18" charset="0"/>
-                            </a:rPr>
-                            <m:t>𝑡</m:t>
-                          </m:r>
-                        </m:oMath>
-                      </m:oMathPara>
-                    </a14:m>
-                    <a:endParaRPr kumimoji="1" lang="ja-JP" altLang="en-US" dirty="0"/>
-                  </a:p>
-                </p:txBody>
-              </p:sp>
-            </mc:Choice>
-            <mc:Fallback>
-              <p:sp>
-                <p:nvSpPr>
-                  <p:cNvPr id="22" name="テキスト ボックス 21"/>
-                  <p:cNvSpPr txBox="1">
-                    <a:spLocks noRot="1" noChangeAspect="1" noMove="1" noResize="1" noEditPoints="1" noAdjustHandles="1" noChangeArrowheads="1" noChangeShapeType="1" noTextEdit="1"/>
-                  </p:cNvSpPr>
-                  <p:nvPr/>
-                </p:nvSpPr>
-                <p:spPr>
-                  <a:xfrm>
-                    <a:off x="6323277" y="3437765"/>
                     <a:ext cx="600395" cy="369332"/>
                   </a:xfrm>
                   <a:prstGeom prst="rect">
@@ -31526,8 +31446,92 @@
               </p:sp>
             </mc:Fallback>
           </mc:AlternateContent>
-          <mc:AlternateContent xmlns:mc="http://schemas.openxmlformats.org/markup-compatibility/2006">
-            <mc:Choice xmlns:a14="http://schemas.microsoft.com/office/drawing/2010/main" Requires="a14">
+          <mc:AlternateContent xmlns:mc="http://schemas.openxmlformats.org/markup-compatibility/2006" xmlns:a14="http://schemas.microsoft.com/office/drawing/2010/main">
+            <mc:Choice Requires="a14">
+              <p:sp>
+                <p:nvSpPr>
+                  <p:cNvPr id="22" name="テキスト ボックス 21"/>
+                  <p:cNvSpPr txBox="1"/>
+                  <p:nvPr/>
+                </p:nvSpPr>
+                <p:spPr>
+                  <a:xfrm>
+                    <a:off x="6323277" y="3437765"/>
+                    <a:ext cx="600395" cy="369332"/>
+                  </a:xfrm>
+                  <a:prstGeom prst="rect">
+                    <a:avLst/>
+                  </a:prstGeom>
+                  <a:noFill/>
+                </p:spPr>
+                <p:txBody>
+                  <a:bodyPr wrap="square" rtlCol="0">
+                    <a:spAutoFit/>
+                  </a:bodyPr>
+                  <a:lstStyle/>
+                  <a:p>
+                    <a:pPr/>
+                    <a14:m>
+                      <m:oMathPara xmlns:m="http://schemas.openxmlformats.org/officeDocument/2006/math">
+                        <m:oMathParaPr>
+                          <m:jc m:val="centerGroup"/>
+                        </m:oMathParaPr>
+                        <m:oMath xmlns:m="http://schemas.openxmlformats.org/officeDocument/2006/math">
+                          <m:r>
+                            <a:rPr kumimoji="1" lang="en-US" altLang="ja-JP" b="0" i="1" smtClean="0">
+                              <a:latin typeface="Cambria Math" panose="02040503050406030204" pitchFamily="18" charset="0"/>
+                            </a:rPr>
+                            <m:t>𝑡</m:t>
+                          </m:r>
+                        </m:oMath>
+                      </m:oMathPara>
+                    </a14:m>
+                    <a:endParaRPr kumimoji="1" lang="ja-JP" altLang="en-US" dirty="0"/>
+                  </a:p>
+                </p:txBody>
+              </p:sp>
+            </mc:Choice>
+            <mc:Fallback xmlns="">
+              <p:sp>
+                <p:nvSpPr>
+                  <p:cNvPr id="22" name="テキスト ボックス 21"/>
+                  <p:cNvSpPr txBox="1">
+                    <a:spLocks noRot="1" noChangeAspect="1" noMove="1" noResize="1" noEditPoints="1" noAdjustHandles="1" noChangeArrowheads="1" noChangeShapeType="1" noTextEdit="1"/>
+                  </p:cNvSpPr>
+                  <p:nvPr/>
+                </p:nvSpPr>
+                <p:spPr>
+                  <a:xfrm>
+                    <a:off x="6323277" y="3437765"/>
+                    <a:ext cx="600395" cy="369332"/>
+                  </a:xfrm>
+                  <a:prstGeom prst="rect">
+                    <a:avLst/>
+                  </a:prstGeom>
+                  <a:blipFill rotWithShape="0">
+                    <a:blip r:embed="rId6"/>
+                    <a:stretch>
+                      <a:fillRect/>
+                    </a:stretch>
+                  </a:blipFill>
+                </p:spPr>
+                <p:txBody>
+                  <a:bodyPr/>
+                  <a:lstStyle/>
+                  <a:p>
+                    <a:r>
+                      <a:rPr lang="ja-JP" altLang="en-US">
+                        <a:noFill/>
+                      </a:rPr>
+                      <a:t> </a:t>
+                    </a:r>
+                  </a:p>
+                </p:txBody>
+              </p:sp>
+            </mc:Fallback>
+          </mc:AlternateContent>
+          <mc:AlternateContent xmlns:mc="http://schemas.openxmlformats.org/markup-compatibility/2006" xmlns:a14="http://schemas.microsoft.com/office/drawing/2010/main">
+            <mc:Choice Requires="a14">
               <p:sp>
                 <p:nvSpPr>
                   <p:cNvPr id="23" name="テキスト ボックス 22"/>
@@ -31550,6 +31554,7 @@
                   </a:bodyPr>
                   <a:lstStyle/>
                   <a:p>
+                    <a:pPr/>
                     <a14:m>
                       <m:oMathPara xmlns:m="http://schemas.openxmlformats.org/officeDocument/2006/math">
                         <m:oMathParaPr>
@@ -31582,7 +31587,7 @@
                 </p:txBody>
               </p:sp>
             </mc:Choice>
-            <mc:Fallback>
+            <mc:Fallback xmlns="">
               <p:sp>
                 <p:nvSpPr>
                   <p:cNvPr id="23" name="テキスト ボックス 22"/>
@@ -31600,7 +31605,7 @@
                     <a:avLst/>
                   </a:prstGeom>
                   <a:blipFill rotWithShape="0">
-                    <a:blip r:embed="rId6"/>
+                    <a:blip r:embed="rId7"/>
                     <a:stretch>
                       <a:fillRect t="-127551" r="-13115"/>
                     </a:stretch>
@@ -31622,8 +31627,8 @@
             </mc:Fallback>
           </mc:AlternateContent>
         </p:grpSp>
-        <mc:AlternateContent xmlns:mc="http://schemas.openxmlformats.org/markup-compatibility/2006">
-          <mc:Choice xmlns:a14="http://schemas.microsoft.com/office/drawing/2010/main" Requires="a14">
+        <mc:AlternateContent xmlns:mc="http://schemas.openxmlformats.org/markup-compatibility/2006" xmlns:a14="http://schemas.microsoft.com/office/drawing/2010/main">
+          <mc:Choice Requires="a14">
             <p:sp>
               <p:nvSpPr>
                 <p:cNvPr id="25" name="テキスト ボックス 24"/>
@@ -31646,6 +31651,7 @@
                 </a:bodyPr>
                 <a:lstStyle/>
                 <a:p>
+                  <a:pPr/>
                   <a14:m>
                     <m:oMathPara xmlns:m="http://schemas.openxmlformats.org/officeDocument/2006/math">
                       <m:oMathParaPr>
@@ -31670,7 +31676,7 @@
                         <m:sSub>
                           <m:sSubPr>
                             <m:ctrlPr>
-                              <a:rPr kumimoji="1" lang="en-US" altLang="ja-JP" sz="1200" b="0" smtClean="0">
+                              <a:rPr kumimoji="1" lang="en-US" altLang="ja-JP" sz="1200" b="0" i="1" smtClean="0">
                                 <a:latin typeface="Cambria Math" panose="02040503050406030204" pitchFamily="18" charset="0"/>
                               </a:rPr>
                             </m:ctrlPr>
@@ -31706,7 +31712,7 @@
               </p:txBody>
             </p:sp>
           </mc:Choice>
-          <mc:Fallback>
+          <mc:Fallback xmlns="">
             <p:sp>
               <p:nvSpPr>
                 <p:cNvPr id="25" name="テキスト ボックス 24"/>
@@ -31724,7 +31730,7 @@
                   <a:avLst/>
                 </a:prstGeom>
                 <a:blipFill rotWithShape="0">
-                  <a:blip r:embed="rId7"/>
+                  <a:blip r:embed="rId8"/>
                   <a:stretch>
                     <a:fillRect b="-4444"/>
                   </a:stretch>
@@ -31838,8 +31844,8 @@
             </a:p>
           </p:txBody>
         </p:sp>
-        <mc:AlternateContent xmlns:mc="http://schemas.openxmlformats.org/markup-compatibility/2006">
-          <mc:Choice xmlns:a14="http://schemas.microsoft.com/office/drawing/2010/main" Requires="a14">
+        <mc:AlternateContent xmlns:mc="http://schemas.openxmlformats.org/markup-compatibility/2006" xmlns:a14="http://schemas.microsoft.com/office/drawing/2010/main">
+          <mc:Choice Requires="a14">
             <p:sp>
               <p:nvSpPr>
                 <p:cNvPr id="29" name="テキスト ボックス 28"/>
@@ -31862,6 +31868,7 @@
                 </a:bodyPr>
                 <a:lstStyle/>
                 <a:p>
+                  <a:pPr/>
                   <a14:m>
                     <m:oMathPara xmlns:m="http://schemas.openxmlformats.org/officeDocument/2006/math">
                       <m:oMathParaPr>
@@ -31871,7 +31878,7 @@
                         <m:sSub>
                           <m:sSubPr>
                             <m:ctrlPr>
-                              <a:rPr kumimoji="1" lang="en-US" altLang="ja-JP" sz="1200" b="0" smtClean="0">
+                              <a:rPr kumimoji="1" lang="en-US" altLang="ja-JP" sz="1200" b="0" i="1" smtClean="0">
                                 <a:latin typeface="Cambria Math" panose="02040503050406030204" pitchFamily="18" charset="0"/>
                               </a:rPr>
                             </m:ctrlPr>
@@ -31907,7 +31914,7 @@
               </p:txBody>
             </p:sp>
           </mc:Choice>
-          <mc:Fallback>
+          <mc:Fallback xmlns="">
             <p:sp>
               <p:nvSpPr>
                 <p:cNvPr id="29" name="テキスト ボックス 28"/>
@@ -31925,7 +31932,7 @@
                   <a:avLst/>
                 </a:prstGeom>
                 <a:blipFill rotWithShape="0">
-                  <a:blip r:embed="rId8"/>
+                  <a:blip r:embed="rId9"/>
                   <a:stretch>
                     <a:fillRect b="-2174"/>
                   </a:stretch>
@@ -32012,8 +32019,8 @@
               <a:chExt cx="8781257" cy="4375230"/>
             </a:xfrm>
           </p:grpSpPr>
-          <mc:AlternateContent xmlns:mc="http://schemas.openxmlformats.org/markup-compatibility/2006">
-            <mc:Choice xmlns:a14="http://schemas.microsoft.com/office/drawing/2010/main" Requires="a14">
+          <mc:AlternateContent xmlns:mc="http://schemas.openxmlformats.org/markup-compatibility/2006" xmlns:a14="http://schemas.microsoft.com/office/drawing/2010/main">
+            <mc:Choice Requires="a14">
               <p:graphicFrame>
                 <p:nvGraphicFramePr>
                   <p:cNvPr id="5" name="グラフ 4"/>
@@ -32039,7 +32046,7 @@
                 </a:graphic>
               </p:graphicFrame>
             </mc:Choice>
-            <mc:Fallback>
+            <mc:Fallback xmlns="">
               <p:graphicFrame>
                 <p:nvGraphicFramePr>
                   <p:cNvPr id="5" name="グラフ 4"/>
@@ -32060,14 +32067,14 @@
                 </p:xfrm>
                 <a:graphic>
                   <a:graphicData uri="http://schemas.openxmlformats.org/drawingml/2006/chart">
-                    <c:chart xmlns:c="http://schemas.openxmlformats.org/drawingml/2006/chart" xmlns:r="http://schemas.openxmlformats.org/officeDocument/2006/relationships" r:id="rId2"/>
+                    <c:chart xmlns:c="http://schemas.openxmlformats.org/drawingml/2006/chart" xmlns:r="http://schemas.openxmlformats.org/officeDocument/2006/relationships" r:id="rId3"/>
                   </a:graphicData>
                 </a:graphic>
               </p:graphicFrame>
             </mc:Fallback>
           </mc:AlternateContent>
-          <mc:AlternateContent xmlns:mc="http://schemas.openxmlformats.org/markup-compatibility/2006">
-            <mc:Choice xmlns:a14="http://schemas.microsoft.com/office/drawing/2010/main" Requires="a14">
+          <mc:AlternateContent xmlns:mc="http://schemas.openxmlformats.org/markup-compatibility/2006" xmlns:a14="http://schemas.microsoft.com/office/drawing/2010/main">
+            <mc:Choice Requires="a14">
               <p:graphicFrame>
                 <p:nvGraphicFramePr>
                   <p:cNvPr id="21" name="グラフ 20"/>
@@ -32088,12 +32095,12 @@
                 </p:xfrm>
                 <a:graphic>
                   <a:graphicData uri="http://schemas.openxmlformats.org/drawingml/2006/chart">
-                    <c:chart xmlns:c="http://schemas.openxmlformats.org/drawingml/2006/chart" xmlns:r="http://schemas.openxmlformats.org/officeDocument/2006/relationships" r:id="rId3"/>
+                    <c:chart xmlns:c="http://schemas.openxmlformats.org/drawingml/2006/chart" xmlns:r="http://schemas.openxmlformats.org/officeDocument/2006/relationships" r:id="rId4"/>
                   </a:graphicData>
                 </a:graphic>
               </p:graphicFrame>
             </mc:Choice>
-            <mc:Fallback>
+            <mc:Fallback xmlns="">
               <p:graphicFrame>
                 <p:nvGraphicFramePr>
                   <p:cNvPr id="21" name="グラフ 20"/>
@@ -32114,7 +32121,7 @@
                 </p:xfrm>
                 <a:graphic>
                   <a:graphicData uri="http://schemas.openxmlformats.org/drawingml/2006/chart">
-                    <c:chart xmlns:c="http://schemas.openxmlformats.org/drawingml/2006/chart" xmlns:r="http://schemas.openxmlformats.org/officeDocument/2006/relationships" r:id="rId3"/>
+                    <c:chart xmlns:c="http://schemas.openxmlformats.org/drawingml/2006/chart" xmlns:r="http://schemas.openxmlformats.org/officeDocument/2006/relationships" r:id="rId5"/>
                   </a:graphicData>
                 </a:graphic>
               </p:graphicFrame>
@@ -32192,8 +32199,8 @@
               </a:fontRef>
             </p:style>
           </p:cxnSp>
-          <mc:AlternateContent xmlns:mc="http://schemas.openxmlformats.org/markup-compatibility/2006">
-            <mc:Choice xmlns:a14="http://schemas.microsoft.com/office/drawing/2010/main" Requires="a14">
+          <mc:AlternateContent xmlns:mc="http://schemas.openxmlformats.org/markup-compatibility/2006" xmlns:a14="http://schemas.microsoft.com/office/drawing/2010/main">
+            <mc:Choice Requires="a14">
               <p:sp>
                 <p:nvSpPr>
                   <p:cNvPr id="17" name="テキスト ボックス 16"/>
@@ -32216,6 +32223,7 @@
                   </a:bodyPr>
                   <a:lstStyle/>
                   <a:p>
+                    <a:pPr/>
                     <a14:m>
                       <m:oMathPara xmlns:m="http://schemas.openxmlformats.org/officeDocument/2006/math">
                         <m:oMathParaPr>
@@ -32236,7 +32244,7 @@
                 </p:txBody>
               </p:sp>
             </mc:Choice>
-            <mc:Fallback>
+            <mc:Fallback xmlns="">
               <p:sp>
                 <p:nvSpPr>
                   <p:cNvPr id="17" name="テキスト ボックス 16"/>
@@ -32254,7 +32262,7 @@
                     <a:avLst/>
                   </a:prstGeom>
                   <a:blipFill rotWithShape="0">
-                    <a:blip r:embed="rId4"/>
+                    <a:blip r:embed="rId6"/>
                     <a:stretch>
                       <a:fillRect/>
                     </a:stretch>
@@ -32275,8 +32283,8 @@
               </p:sp>
             </mc:Fallback>
           </mc:AlternateContent>
-          <mc:AlternateContent xmlns:mc="http://schemas.openxmlformats.org/markup-compatibility/2006">
-            <mc:Choice xmlns:a14="http://schemas.microsoft.com/office/drawing/2010/main" Requires="a14">
+          <mc:AlternateContent xmlns:mc="http://schemas.openxmlformats.org/markup-compatibility/2006" xmlns:a14="http://schemas.microsoft.com/office/drawing/2010/main">
+            <mc:Choice Requires="a14">
               <p:sp>
                 <p:nvSpPr>
                   <p:cNvPr id="18" name="テキスト ボックス 17"/>
@@ -32299,6 +32307,7 @@
                   </a:bodyPr>
                   <a:lstStyle/>
                   <a:p>
+                    <a:pPr/>
                     <a14:m>
                       <m:oMathPara xmlns:m="http://schemas.openxmlformats.org/officeDocument/2006/math">
                         <m:oMathParaPr>
@@ -32331,7 +32340,7 @@
                 </p:txBody>
               </p:sp>
             </mc:Choice>
-            <mc:Fallback>
+            <mc:Fallback xmlns="">
               <p:sp>
                 <p:nvSpPr>
                   <p:cNvPr id="18" name="テキスト ボックス 17"/>
@@ -32349,7 +32358,7 @@
                     <a:avLst/>
                   </a:prstGeom>
                   <a:blipFill rotWithShape="0">
-                    <a:blip r:embed="rId5"/>
+                    <a:blip r:embed="rId7"/>
                     <a:stretch>
                       <a:fillRect t="-201020" r="-13115" b="-3061"/>
                     </a:stretch>
@@ -32370,8 +32379,8 @@
               </p:sp>
             </mc:Fallback>
           </mc:AlternateContent>
-          <mc:AlternateContent xmlns:mc="http://schemas.openxmlformats.org/markup-compatibility/2006">
-            <mc:Choice xmlns:a14="http://schemas.microsoft.com/office/drawing/2010/main" Requires="a14">
+          <mc:AlternateContent xmlns:mc="http://schemas.openxmlformats.org/markup-compatibility/2006" xmlns:a14="http://schemas.microsoft.com/office/drawing/2010/main">
+            <mc:Choice Requires="a14">
               <p:graphicFrame>
                 <p:nvGraphicFramePr>
                   <p:cNvPr id="22" name="グラフ 21"/>
@@ -32392,12 +32401,12 @@
                 </p:xfrm>
                 <a:graphic>
                   <a:graphicData uri="http://schemas.openxmlformats.org/drawingml/2006/chart">
-                    <c:chart xmlns:c="http://schemas.openxmlformats.org/drawingml/2006/chart" xmlns:r="http://schemas.openxmlformats.org/officeDocument/2006/relationships" r:id="rId6"/>
+                    <c:chart xmlns:c="http://schemas.openxmlformats.org/drawingml/2006/chart" xmlns:r="http://schemas.openxmlformats.org/officeDocument/2006/relationships" r:id="rId8"/>
                   </a:graphicData>
                 </a:graphic>
               </p:graphicFrame>
             </mc:Choice>
-            <mc:Fallback>
+            <mc:Fallback xmlns="">
               <p:graphicFrame>
                 <p:nvGraphicFramePr>
                   <p:cNvPr id="22" name="グラフ 21"/>
@@ -32418,7 +32427,7 @@
                 </p:xfrm>
                 <a:graphic>
                   <a:graphicData uri="http://schemas.openxmlformats.org/drawingml/2006/chart">
-                    <c:chart xmlns:c="http://schemas.openxmlformats.org/drawingml/2006/chart" xmlns:r="http://schemas.openxmlformats.org/officeDocument/2006/relationships" r:id="rId6"/>
+                    <c:chart xmlns:c="http://schemas.openxmlformats.org/drawingml/2006/chart" xmlns:r="http://schemas.openxmlformats.org/officeDocument/2006/relationships" r:id="rId9"/>
                   </a:graphicData>
                 </a:graphic>
               </p:graphicFrame>
@@ -32681,8 +32690,8 @@
             </a:fontRef>
           </p:style>
         </p:cxnSp>
-        <mc:AlternateContent xmlns:mc="http://schemas.openxmlformats.org/markup-compatibility/2006">
-          <mc:Choice xmlns:a14="http://schemas.microsoft.com/office/drawing/2010/main" Requires="a14">
+        <mc:AlternateContent xmlns:mc="http://schemas.openxmlformats.org/markup-compatibility/2006" xmlns:a14="http://schemas.microsoft.com/office/drawing/2010/main">
+          <mc:Choice Requires="a14">
             <p:sp>
               <p:nvSpPr>
                 <p:cNvPr id="29" name="テキスト ボックス 28"/>
@@ -32705,6 +32714,7 @@
                 </a:bodyPr>
                 <a:lstStyle/>
                 <a:p>
+                  <a:pPr/>
                   <a14:m>
                     <m:oMathPara xmlns:m="http://schemas.openxmlformats.org/officeDocument/2006/math">
                       <m:oMathParaPr>
@@ -32747,7 +32757,7 @@
               </p:txBody>
             </p:sp>
           </mc:Choice>
-          <mc:Fallback>
+          <mc:Fallback xmlns="">
             <p:sp>
               <p:nvSpPr>
                 <p:cNvPr id="29" name="テキスト ボックス 28"/>
@@ -32765,7 +32775,7 @@
                   <a:avLst/>
                 </a:prstGeom>
                 <a:blipFill rotWithShape="0">
-                  <a:blip r:embed="rId7"/>
+                  <a:blip r:embed="rId10"/>
                   <a:stretch>
                     <a:fillRect b="-1515"/>
                   </a:stretch>
@@ -33301,8 +33311,8 @@
             </a:prstGeom>
           </p:spPr>
         </p:pic>
-        <mc:AlternateContent xmlns:mc="http://schemas.openxmlformats.org/markup-compatibility/2006">
-          <mc:Choice xmlns:a14="http://schemas.microsoft.com/office/drawing/2010/main" Requires="a14">
+        <mc:AlternateContent xmlns:mc="http://schemas.openxmlformats.org/markup-compatibility/2006" xmlns:a14="http://schemas.microsoft.com/office/drawing/2010/main">
+          <mc:Choice Requires="a14">
             <p:sp>
               <p:nvSpPr>
                 <p:cNvPr id="5" name="テキスト ボックス 4"/>
@@ -33373,7 +33383,7 @@
               </p:txBody>
             </p:sp>
           </mc:Choice>
-          <mc:Fallback>
+          <mc:Fallback xmlns="">
             <p:sp>
               <p:nvSpPr>
                 <p:cNvPr id="5" name="テキスト ボックス 4"/>
@@ -33412,8 +33422,8 @@
             </p:sp>
           </mc:Fallback>
         </mc:AlternateContent>
-        <mc:AlternateContent xmlns:mc="http://schemas.openxmlformats.org/markup-compatibility/2006">
-          <mc:Choice xmlns:a14="http://schemas.microsoft.com/office/drawing/2010/main" Requires="a14">
+        <mc:AlternateContent xmlns:mc="http://schemas.openxmlformats.org/markup-compatibility/2006" xmlns:a14="http://schemas.microsoft.com/office/drawing/2010/main">
+          <mc:Choice Requires="a14">
             <p:sp>
               <p:nvSpPr>
                 <p:cNvPr id="6" name="テキスト ボックス 5"/>
@@ -33484,7 +33494,7 @@
               </p:txBody>
             </p:sp>
           </mc:Choice>
-          <mc:Fallback>
+          <mc:Fallback xmlns="">
             <p:sp>
               <p:nvSpPr>
                 <p:cNvPr id="6" name="テキスト ボックス 5"/>
@@ -33599,8 +33609,8 @@
             </a:prstGeom>
           </p:spPr>
         </p:pic>
-        <mc:AlternateContent xmlns:mc="http://schemas.openxmlformats.org/markup-compatibility/2006">
-          <mc:Choice xmlns:a14="http://schemas.microsoft.com/office/drawing/2010/main" Requires="a14">
+        <mc:AlternateContent xmlns:mc="http://schemas.openxmlformats.org/markup-compatibility/2006" xmlns:a14="http://schemas.microsoft.com/office/drawing/2010/main">
+          <mc:Choice Requires="a14">
             <p:sp>
               <p:nvSpPr>
                 <p:cNvPr id="5" name="テキスト ボックス 4"/>
@@ -33687,7 +33697,7 @@
               </p:txBody>
             </p:sp>
           </mc:Choice>
-          <mc:Fallback>
+          <mc:Fallback xmlns="">
             <p:sp>
               <p:nvSpPr>
                 <p:cNvPr id="5" name="テキスト ボックス 4"/>
@@ -33726,8 +33736,8 @@
             </p:sp>
           </mc:Fallback>
         </mc:AlternateContent>
-        <mc:AlternateContent xmlns:mc="http://schemas.openxmlformats.org/markup-compatibility/2006">
-          <mc:Choice xmlns:a14="http://schemas.microsoft.com/office/drawing/2010/main" Requires="a14">
+        <mc:AlternateContent xmlns:mc="http://schemas.openxmlformats.org/markup-compatibility/2006" xmlns:a14="http://schemas.microsoft.com/office/drawing/2010/main">
+          <mc:Choice Requires="a14">
             <p:sp>
               <p:nvSpPr>
                 <p:cNvPr id="7" name="テキスト ボックス 6"/>
@@ -33811,7 +33821,7 @@
               </p:txBody>
             </p:sp>
           </mc:Choice>
-          <mc:Fallback>
+          <mc:Fallback xmlns="">
             <p:sp>
               <p:nvSpPr>
                 <p:cNvPr id="7" name="テキスト ボックス 6"/>
@@ -33850,8 +33860,8 @@
             </p:sp>
           </mc:Fallback>
         </mc:AlternateContent>
-        <mc:AlternateContent xmlns:mc="http://schemas.openxmlformats.org/markup-compatibility/2006">
-          <mc:Choice xmlns:a14="http://schemas.microsoft.com/office/drawing/2010/main" Requires="a14">
+        <mc:AlternateContent xmlns:mc="http://schemas.openxmlformats.org/markup-compatibility/2006" xmlns:a14="http://schemas.microsoft.com/office/drawing/2010/main">
+          <mc:Choice Requires="a14">
             <p:sp>
               <p:nvSpPr>
                 <p:cNvPr id="8" name="テキスト ボックス 7"/>
@@ -33935,7 +33945,7 @@
               </p:txBody>
             </p:sp>
           </mc:Choice>
-          <mc:Fallback>
+          <mc:Fallback xmlns="">
             <p:sp>
               <p:nvSpPr>
                 <p:cNvPr id="8" name="テキスト ボックス 7"/>
@@ -34056,8 +34066,8 @@
             </a:prstGeom>
           </p:spPr>
         </p:pic>
-        <mc:AlternateContent xmlns:mc="http://schemas.openxmlformats.org/markup-compatibility/2006">
-          <mc:Choice xmlns:a14="http://schemas.microsoft.com/office/drawing/2010/main" Requires="a14">
+        <mc:AlternateContent xmlns:mc="http://schemas.openxmlformats.org/markup-compatibility/2006" xmlns:a14="http://schemas.microsoft.com/office/drawing/2010/main">
+          <mc:Choice Requires="a14">
             <p:sp>
               <p:nvSpPr>
                 <p:cNvPr id="8" name="テキスト ボックス 7"/>
@@ -34128,7 +34138,7 @@
               </p:txBody>
             </p:sp>
           </mc:Choice>
-          <mc:Fallback>
+          <mc:Fallback xmlns="">
             <p:sp>
               <p:nvSpPr>
                 <p:cNvPr id="8" name="テキスト ボックス 7"/>
@@ -34185,6 +34195,1848 @@
       </p:par>
     </p:tnLst>
   </p:timing>
+</p:sld>
+</file>
+
+<file path=ppt/slides/slide24.xml><?xml version="1.0" encoding="utf-8"?>
+<p:sld xmlns:a="http://schemas.openxmlformats.org/drawingml/2006/main" xmlns:r="http://schemas.openxmlformats.org/officeDocument/2006/relationships" xmlns:p="http://schemas.openxmlformats.org/presentationml/2006/main">
+  <p:cSld>
+    <p:spTree>
+      <p:nvGrpSpPr>
+        <p:cNvPr id="1" name=""/>
+        <p:cNvGrpSpPr/>
+        <p:nvPr/>
+      </p:nvGrpSpPr>
+      <p:grpSpPr>
+        <a:xfrm>
+          <a:off x="0" y="0"/>
+          <a:ext cx="0" cy="0"/>
+          <a:chOff x="0" y="0"/>
+          <a:chExt cx="0" cy="0"/>
+        </a:xfrm>
+      </p:grpSpPr>
+      <p:sp>
+        <p:nvSpPr>
+          <p:cNvPr id="4" name="円/楕円 3"/>
+          <p:cNvSpPr/>
+          <p:nvPr/>
+        </p:nvSpPr>
+        <p:spPr>
+          <a:xfrm>
+            <a:off x="1601606" y="1683923"/>
+            <a:ext cx="3600000" cy="3600000"/>
+          </a:xfrm>
+          <a:prstGeom prst="ellipse">
+            <a:avLst/>
+          </a:prstGeom>
+          <a:noFill/>
+          <a:ln>
+            <a:solidFill>
+              <a:schemeClr val="tx1"/>
+            </a:solidFill>
+            <a:prstDash val="sysDot"/>
+          </a:ln>
+          <a:scene3d>
+            <a:camera prst="orthographicFront">
+              <a:rot lat="4500002" lon="0" rev="0"/>
+            </a:camera>
+            <a:lightRig rig="threePt" dir="t"/>
+          </a:scene3d>
+        </p:spPr>
+        <p:style>
+          <a:lnRef idx="2">
+            <a:schemeClr val="accent1">
+              <a:shade val="50000"/>
+            </a:schemeClr>
+          </a:lnRef>
+          <a:fillRef idx="1">
+            <a:schemeClr val="accent1"/>
+          </a:fillRef>
+          <a:effectRef idx="0">
+            <a:schemeClr val="accent1"/>
+          </a:effectRef>
+          <a:fontRef idx="minor">
+            <a:schemeClr val="lt1"/>
+          </a:fontRef>
+        </p:style>
+        <p:txBody>
+          <a:bodyPr rtlCol="0" anchor="ctr"/>
+          <a:lstStyle/>
+          <a:p>
+            <a:pPr algn="ctr"/>
+            <a:endParaRPr kumimoji="1" lang="ja-JP" altLang="en-US" dirty="0"/>
+          </a:p>
+        </p:txBody>
+      </p:sp>
+      <p:sp>
+        <p:nvSpPr>
+          <p:cNvPr id="11" name="直方体 10"/>
+          <p:cNvSpPr/>
+          <p:nvPr/>
+        </p:nvSpPr>
+        <p:spPr>
+          <a:xfrm>
+            <a:off x="4639554" y="3655192"/>
+            <a:ext cx="385766" cy="106220"/>
+          </a:xfrm>
+          <a:prstGeom prst="cube">
+            <a:avLst>
+              <a:gd name="adj" fmla="val 68983"/>
+            </a:avLst>
+          </a:prstGeom>
+          <a:solidFill>
+            <a:schemeClr val="bg1"/>
+          </a:solidFill>
+          <a:ln>
+            <a:solidFill>
+              <a:schemeClr val="tx1"/>
+            </a:solidFill>
+          </a:ln>
+        </p:spPr>
+        <p:style>
+          <a:lnRef idx="2">
+            <a:schemeClr val="accent1">
+              <a:shade val="50000"/>
+            </a:schemeClr>
+          </a:lnRef>
+          <a:fillRef idx="1">
+            <a:schemeClr val="accent1"/>
+          </a:fillRef>
+          <a:effectRef idx="0">
+            <a:schemeClr val="accent1"/>
+          </a:effectRef>
+          <a:fontRef idx="minor">
+            <a:schemeClr val="lt1"/>
+          </a:fontRef>
+        </p:style>
+        <p:txBody>
+          <a:bodyPr rtlCol="0" anchor="ctr"/>
+          <a:lstStyle/>
+          <a:p>
+            <a:pPr algn="ctr"/>
+            <a:endParaRPr kumimoji="1" lang="ja-JP" altLang="en-US"/>
+          </a:p>
+        </p:txBody>
+      </p:sp>
+      <p:sp>
+        <p:nvSpPr>
+          <p:cNvPr id="14" name="テキスト ボックス 13"/>
+          <p:cNvSpPr txBox="1"/>
+          <p:nvPr/>
+        </p:nvSpPr>
+        <p:spPr>
+          <a:xfrm>
+            <a:off x="5338732" y="3200766"/>
+            <a:ext cx="1670491" cy="369332"/>
+          </a:xfrm>
+          <a:prstGeom prst="rect">
+            <a:avLst/>
+          </a:prstGeom>
+          <a:noFill/>
+        </p:spPr>
+        <p:txBody>
+          <a:bodyPr wrap="square" rtlCol="0">
+            <a:spAutoFit/>
+          </a:bodyPr>
+          <a:lstStyle/>
+          <a:p>
+            <a:r>
+              <a:rPr kumimoji="1" lang="en-US" altLang="ja-JP" dirty="0" smtClean="0"/>
+              <a:t>Injection point</a:t>
+            </a:r>
+            <a:endParaRPr kumimoji="1" lang="ja-JP" altLang="en-US" dirty="0"/>
+          </a:p>
+        </p:txBody>
+      </p:sp>
+      <p:sp>
+        <p:nvSpPr>
+          <p:cNvPr id="18" name="対角する 2 つの角を切り取った四角形 17"/>
+          <p:cNvSpPr/>
+          <p:nvPr/>
+        </p:nvSpPr>
+        <p:spPr>
+          <a:xfrm>
+            <a:off x="3513536" y="2891127"/>
+            <a:ext cx="565423" cy="261796"/>
+          </a:xfrm>
+          <a:prstGeom prst="snip2DiagRect">
+            <a:avLst>
+              <a:gd name="adj1" fmla="val 32434"/>
+              <a:gd name="adj2" fmla="val 36825"/>
+            </a:avLst>
+          </a:prstGeom>
+          <a:noFill/>
+          <a:ln w="9525">
+            <a:solidFill>
+              <a:schemeClr val="tx1"/>
+            </a:solidFill>
+          </a:ln>
+          <a:scene3d>
+            <a:camera prst="orthographicFront">
+              <a:rot lat="0" lon="14999953" rev="0"/>
+            </a:camera>
+            <a:lightRig rig="threePt" dir="t"/>
+          </a:scene3d>
+        </p:spPr>
+        <p:style>
+          <a:lnRef idx="2">
+            <a:schemeClr val="accent1">
+              <a:shade val="50000"/>
+            </a:schemeClr>
+          </a:lnRef>
+          <a:fillRef idx="1">
+            <a:schemeClr val="accent1"/>
+          </a:fillRef>
+          <a:effectRef idx="0">
+            <a:schemeClr val="accent1"/>
+          </a:effectRef>
+          <a:fontRef idx="minor">
+            <a:schemeClr val="lt1"/>
+          </a:fontRef>
+        </p:style>
+        <p:txBody>
+          <a:bodyPr rtlCol="0" anchor="ctr"/>
+          <a:lstStyle/>
+          <a:p>
+            <a:pPr algn="ctr"/>
+            <a:endParaRPr kumimoji="1" lang="ja-JP" altLang="en-US"/>
+          </a:p>
+        </p:txBody>
+      </p:sp>
+      <p:sp>
+        <p:nvSpPr>
+          <p:cNvPr id="20" name="テキスト ボックス 19"/>
+          <p:cNvSpPr txBox="1"/>
+          <p:nvPr/>
+        </p:nvSpPr>
+        <p:spPr>
+          <a:xfrm>
+            <a:off x="4054007" y="3945342"/>
+            <a:ext cx="1670491" cy="369332"/>
+          </a:xfrm>
+          <a:prstGeom prst="rect">
+            <a:avLst/>
+          </a:prstGeom>
+          <a:noFill/>
+        </p:spPr>
+        <p:txBody>
+          <a:bodyPr wrap="square" rtlCol="0">
+            <a:spAutoFit/>
+          </a:bodyPr>
+          <a:lstStyle/>
+          <a:p>
+            <a:r>
+              <a:rPr kumimoji="1" lang="en-US" altLang="ja-JP" dirty="0" smtClean="0"/>
+              <a:t>Kicker</a:t>
+            </a:r>
+            <a:r>
+              <a:rPr lang="ja-JP" altLang="en-US" dirty="0"/>
+              <a:t> </a:t>
+            </a:r>
+            <a:r>
+              <a:rPr lang="en-US" altLang="ja-JP" dirty="0" smtClean="0"/>
+              <a:t>Magnet</a:t>
+            </a:r>
+            <a:endParaRPr kumimoji="1" lang="ja-JP" altLang="en-US" dirty="0"/>
+          </a:p>
+        </p:txBody>
+      </p:sp>
+      <p:sp>
+        <p:nvSpPr>
+          <p:cNvPr id="22" name="フリーフォーム 21"/>
+          <p:cNvSpPr/>
+          <p:nvPr/>
+        </p:nvSpPr>
+        <p:spPr>
+          <a:xfrm>
+            <a:off x="2873216" y="2951313"/>
+            <a:ext cx="2361583" cy="830751"/>
+          </a:xfrm>
+          <a:custGeom>
+            <a:avLst/>
+            <a:gdLst>
+              <a:gd name="connsiteX0" fmla="*/ 1926432 w 2361583"/>
+              <a:gd name="connsiteY0" fmla="*/ 823921 h 830751"/>
+              <a:gd name="connsiteX1" fmla="*/ 2143125 w 2361583"/>
+              <a:gd name="connsiteY1" fmla="*/ 812015 h 830751"/>
+              <a:gd name="connsiteX2" fmla="*/ 2085975 w 2361583"/>
+              <a:gd name="connsiteY2" fmla="*/ 664377 h 830751"/>
+              <a:gd name="connsiteX3" fmla="*/ 2321719 w 2361583"/>
+              <a:gd name="connsiteY3" fmla="*/ 666758 h 830751"/>
+              <a:gd name="connsiteX4" fmla="*/ 2247900 w 2361583"/>
+              <a:gd name="connsiteY4" fmla="*/ 528646 h 830751"/>
+              <a:gd name="connsiteX5" fmla="*/ 2359819 w 2361583"/>
+              <a:gd name="connsiteY5" fmla="*/ 428633 h 830751"/>
+              <a:gd name="connsiteX6" fmla="*/ 2140744 w 2361583"/>
+              <a:gd name="connsiteY6" fmla="*/ 371483 h 830751"/>
+              <a:gd name="connsiteX7" fmla="*/ 2059782 w 2361583"/>
+              <a:gd name="connsiteY7" fmla="*/ 214321 h 830751"/>
+              <a:gd name="connsiteX8" fmla="*/ 1807369 w 2361583"/>
+              <a:gd name="connsiteY8" fmla="*/ 257183 h 830751"/>
+              <a:gd name="connsiteX9" fmla="*/ 1685925 w 2361583"/>
+              <a:gd name="connsiteY9" fmla="*/ 119071 h 830751"/>
+              <a:gd name="connsiteX10" fmla="*/ 1490663 w 2361583"/>
+              <a:gd name="connsiteY10" fmla="*/ 200033 h 830751"/>
+              <a:gd name="connsiteX11" fmla="*/ 1388269 w 2361583"/>
+              <a:gd name="connsiteY11" fmla="*/ 57158 h 830751"/>
+              <a:gd name="connsiteX12" fmla="*/ 1173957 w 2361583"/>
+              <a:gd name="connsiteY12" fmla="*/ 150027 h 830751"/>
+              <a:gd name="connsiteX13" fmla="*/ 1035844 w 2361583"/>
+              <a:gd name="connsiteY13" fmla="*/ 23821 h 830751"/>
+              <a:gd name="connsiteX14" fmla="*/ 859632 w 2361583"/>
+              <a:gd name="connsiteY14" fmla="*/ 128596 h 830751"/>
+              <a:gd name="connsiteX15" fmla="*/ 731044 w 2361583"/>
+              <a:gd name="connsiteY15" fmla="*/ 8 h 830751"/>
+              <a:gd name="connsiteX16" fmla="*/ 528638 w 2361583"/>
+              <a:gd name="connsiteY16" fmla="*/ 121452 h 830751"/>
+              <a:gd name="connsiteX17" fmla="*/ 342900 w 2361583"/>
+              <a:gd name="connsiteY17" fmla="*/ 4771 h 830751"/>
+              <a:gd name="connsiteX18" fmla="*/ 164307 w 2361583"/>
+              <a:gd name="connsiteY18" fmla="*/ 130977 h 830751"/>
+              <a:gd name="connsiteX19" fmla="*/ 0 w 2361583"/>
+              <a:gd name="connsiteY19" fmla="*/ 21440 h 830751"/>
+            </a:gdLst>
+            <a:ahLst/>
+            <a:cxnLst>
+              <a:cxn ang="0">
+                <a:pos x="connsiteX0" y="connsiteY0"/>
+              </a:cxn>
+              <a:cxn ang="0">
+                <a:pos x="connsiteX1" y="connsiteY1"/>
+              </a:cxn>
+              <a:cxn ang="0">
+                <a:pos x="connsiteX2" y="connsiteY2"/>
+              </a:cxn>
+              <a:cxn ang="0">
+                <a:pos x="connsiteX3" y="connsiteY3"/>
+              </a:cxn>
+              <a:cxn ang="0">
+                <a:pos x="connsiteX4" y="connsiteY4"/>
+              </a:cxn>
+              <a:cxn ang="0">
+                <a:pos x="connsiteX5" y="connsiteY5"/>
+              </a:cxn>
+              <a:cxn ang="0">
+                <a:pos x="connsiteX6" y="connsiteY6"/>
+              </a:cxn>
+              <a:cxn ang="0">
+                <a:pos x="connsiteX7" y="connsiteY7"/>
+              </a:cxn>
+              <a:cxn ang="0">
+                <a:pos x="connsiteX8" y="connsiteY8"/>
+              </a:cxn>
+              <a:cxn ang="0">
+                <a:pos x="connsiteX9" y="connsiteY9"/>
+              </a:cxn>
+              <a:cxn ang="0">
+                <a:pos x="connsiteX10" y="connsiteY10"/>
+              </a:cxn>
+              <a:cxn ang="0">
+                <a:pos x="connsiteX11" y="connsiteY11"/>
+              </a:cxn>
+              <a:cxn ang="0">
+                <a:pos x="connsiteX12" y="connsiteY12"/>
+              </a:cxn>
+              <a:cxn ang="0">
+                <a:pos x="connsiteX13" y="connsiteY13"/>
+              </a:cxn>
+              <a:cxn ang="0">
+                <a:pos x="connsiteX14" y="connsiteY14"/>
+              </a:cxn>
+              <a:cxn ang="0">
+                <a:pos x="connsiteX15" y="connsiteY15"/>
+              </a:cxn>
+              <a:cxn ang="0">
+                <a:pos x="connsiteX16" y="connsiteY16"/>
+              </a:cxn>
+              <a:cxn ang="0">
+                <a:pos x="connsiteX17" y="connsiteY17"/>
+              </a:cxn>
+              <a:cxn ang="0">
+                <a:pos x="connsiteX18" y="connsiteY18"/>
+              </a:cxn>
+              <a:cxn ang="0">
+                <a:pos x="connsiteX19" y="connsiteY19"/>
+              </a:cxn>
+            </a:cxnLst>
+            <a:rect l="l" t="t" r="r" b="b"/>
+            <a:pathLst>
+              <a:path w="2361583" h="830751">
+                <a:moveTo>
+                  <a:pt x="1926432" y="823921"/>
+                </a:moveTo>
+                <a:cubicBezTo>
+                  <a:pt x="2021483" y="831263"/>
+                  <a:pt x="2116535" y="838606"/>
+                  <a:pt x="2143125" y="812015"/>
+                </a:cubicBezTo>
+                <a:cubicBezTo>
+                  <a:pt x="2169715" y="785424"/>
+                  <a:pt x="2056209" y="688586"/>
+                  <a:pt x="2085975" y="664377"/>
+                </a:cubicBezTo>
+                <a:cubicBezTo>
+                  <a:pt x="2115741" y="640168"/>
+                  <a:pt x="2294732" y="689380"/>
+                  <a:pt x="2321719" y="666758"/>
+                </a:cubicBezTo>
+                <a:cubicBezTo>
+                  <a:pt x="2348707" y="644136"/>
+                  <a:pt x="2241550" y="568333"/>
+                  <a:pt x="2247900" y="528646"/>
+                </a:cubicBezTo>
+                <a:cubicBezTo>
+                  <a:pt x="2254250" y="488959"/>
+                  <a:pt x="2377678" y="454827"/>
+                  <a:pt x="2359819" y="428633"/>
+                </a:cubicBezTo>
+                <a:cubicBezTo>
+                  <a:pt x="2341960" y="402439"/>
+                  <a:pt x="2190750" y="407202"/>
+                  <a:pt x="2140744" y="371483"/>
+                </a:cubicBezTo>
+                <a:cubicBezTo>
+                  <a:pt x="2090738" y="335764"/>
+                  <a:pt x="2115345" y="233371"/>
+                  <a:pt x="2059782" y="214321"/>
+                </a:cubicBezTo>
+                <a:cubicBezTo>
+                  <a:pt x="2004220" y="195271"/>
+                  <a:pt x="1869678" y="273058"/>
+                  <a:pt x="1807369" y="257183"/>
+                </a:cubicBezTo>
+                <a:cubicBezTo>
+                  <a:pt x="1745060" y="241308"/>
+                  <a:pt x="1738709" y="128596"/>
+                  <a:pt x="1685925" y="119071"/>
+                </a:cubicBezTo>
+                <a:cubicBezTo>
+                  <a:pt x="1633141" y="109546"/>
+                  <a:pt x="1540272" y="210352"/>
+                  <a:pt x="1490663" y="200033"/>
+                </a:cubicBezTo>
+                <a:cubicBezTo>
+                  <a:pt x="1441054" y="189714"/>
+                  <a:pt x="1441053" y="65492"/>
+                  <a:pt x="1388269" y="57158"/>
+                </a:cubicBezTo>
+                <a:cubicBezTo>
+                  <a:pt x="1335485" y="48824"/>
+                  <a:pt x="1232694" y="155583"/>
+                  <a:pt x="1173957" y="150027"/>
+                </a:cubicBezTo>
+                <a:cubicBezTo>
+                  <a:pt x="1115220" y="144471"/>
+                  <a:pt x="1088231" y="27393"/>
+                  <a:pt x="1035844" y="23821"/>
+                </a:cubicBezTo>
+                <a:cubicBezTo>
+                  <a:pt x="983457" y="20249"/>
+                  <a:pt x="910432" y="132565"/>
+                  <a:pt x="859632" y="128596"/>
+                </a:cubicBezTo>
+                <a:cubicBezTo>
+                  <a:pt x="808832" y="124627"/>
+                  <a:pt x="786210" y="1199"/>
+                  <a:pt x="731044" y="8"/>
+                </a:cubicBezTo>
+                <a:cubicBezTo>
+                  <a:pt x="675878" y="-1183"/>
+                  <a:pt x="593329" y="120658"/>
+                  <a:pt x="528638" y="121452"/>
+                </a:cubicBezTo>
+                <a:cubicBezTo>
+                  <a:pt x="463947" y="122246"/>
+                  <a:pt x="403622" y="3184"/>
+                  <a:pt x="342900" y="4771"/>
+                </a:cubicBezTo>
+                <a:cubicBezTo>
+                  <a:pt x="282178" y="6358"/>
+                  <a:pt x="221457" y="128199"/>
+                  <a:pt x="164307" y="130977"/>
+                </a:cubicBezTo>
+                <a:cubicBezTo>
+                  <a:pt x="107157" y="133755"/>
+                  <a:pt x="53578" y="77597"/>
+                  <a:pt x="0" y="21440"/>
+                </a:cubicBezTo>
+              </a:path>
+            </a:pathLst>
+          </a:custGeom>
+          <a:noFill/>
+          <a:ln>
+            <a:solidFill>
+              <a:schemeClr val="accent2"/>
+            </a:solidFill>
+            <a:tailEnd type="triangle"/>
+          </a:ln>
+        </p:spPr>
+        <p:style>
+          <a:lnRef idx="2">
+            <a:schemeClr val="accent1">
+              <a:shade val="50000"/>
+            </a:schemeClr>
+          </a:lnRef>
+          <a:fillRef idx="1">
+            <a:schemeClr val="accent1"/>
+          </a:fillRef>
+          <a:effectRef idx="0">
+            <a:schemeClr val="accent1"/>
+          </a:effectRef>
+          <a:fontRef idx="minor">
+            <a:schemeClr val="lt1"/>
+          </a:fontRef>
+        </p:style>
+        <p:txBody>
+          <a:bodyPr rtlCol="0" anchor="ctr"/>
+          <a:lstStyle/>
+          <a:p>
+            <a:pPr algn="ctr"/>
+            <a:endParaRPr kumimoji="1" lang="ja-JP" altLang="en-US"/>
+          </a:p>
+        </p:txBody>
+      </p:sp>
+      <p:sp>
+        <p:nvSpPr>
+          <p:cNvPr id="23" name="フリーフォーム 22"/>
+          <p:cNvSpPr/>
+          <p:nvPr/>
+        </p:nvSpPr>
+        <p:spPr>
+          <a:xfrm>
+            <a:off x="2901791" y="2875121"/>
+            <a:ext cx="2307432" cy="616744"/>
+          </a:xfrm>
+          <a:custGeom>
+            <a:avLst/>
+            <a:gdLst>
+              <a:gd name="connsiteX0" fmla="*/ 2307432 w 2307432"/>
+              <a:gd name="connsiteY0" fmla="*/ 616744 h 616744"/>
+              <a:gd name="connsiteX1" fmla="*/ 2135982 w 2307432"/>
+              <a:gd name="connsiteY1" fmla="*/ 535782 h 616744"/>
+              <a:gd name="connsiteX2" fmla="*/ 2152650 w 2307432"/>
+              <a:gd name="connsiteY2" fmla="*/ 266700 h 616744"/>
+              <a:gd name="connsiteX3" fmla="*/ 1795463 w 2307432"/>
+              <a:gd name="connsiteY3" fmla="*/ 385763 h 616744"/>
+              <a:gd name="connsiteX4" fmla="*/ 1683544 w 2307432"/>
+              <a:gd name="connsiteY4" fmla="*/ 130969 h 616744"/>
+              <a:gd name="connsiteX5" fmla="*/ 1438275 w 2307432"/>
+              <a:gd name="connsiteY5" fmla="*/ 323850 h 616744"/>
+              <a:gd name="connsiteX6" fmla="*/ 1343025 w 2307432"/>
+              <a:gd name="connsiteY6" fmla="*/ 52388 h 616744"/>
+              <a:gd name="connsiteX7" fmla="*/ 1090613 w 2307432"/>
+              <a:gd name="connsiteY7" fmla="*/ 297657 h 616744"/>
+              <a:gd name="connsiteX8" fmla="*/ 990600 w 2307432"/>
+              <a:gd name="connsiteY8" fmla="*/ 38100 h 616744"/>
+              <a:gd name="connsiteX9" fmla="*/ 800100 w 2307432"/>
+              <a:gd name="connsiteY9" fmla="*/ 259557 h 616744"/>
+              <a:gd name="connsiteX10" fmla="*/ 702469 w 2307432"/>
+              <a:gd name="connsiteY10" fmla="*/ 2382 h 616744"/>
+              <a:gd name="connsiteX11" fmla="*/ 490538 w 2307432"/>
+              <a:gd name="connsiteY11" fmla="*/ 254794 h 616744"/>
+              <a:gd name="connsiteX12" fmla="*/ 309563 w 2307432"/>
+              <a:gd name="connsiteY12" fmla="*/ 26194 h 616744"/>
+              <a:gd name="connsiteX13" fmla="*/ 154782 w 2307432"/>
+              <a:gd name="connsiteY13" fmla="*/ 257175 h 616744"/>
+              <a:gd name="connsiteX14" fmla="*/ 0 w 2307432"/>
+              <a:gd name="connsiteY14" fmla="*/ 0 h 616744"/>
+            </a:gdLst>
+            <a:ahLst/>
+            <a:cxnLst>
+              <a:cxn ang="0">
+                <a:pos x="connsiteX0" y="connsiteY0"/>
+              </a:cxn>
+              <a:cxn ang="0">
+                <a:pos x="connsiteX1" y="connsiteY1"/>
+              </a:cxn>
+              <a:cxn ang="0">
+                <a:pos x="connsiteX2" y="connsiteY2"/>
+              </a:cxn>
+              <a:cxn ang="0">
+                <a:pos x="connsiteX3" y="connsiteY3"/>
+              </a:cxn>
+              <a:cxn ang="0">
+                <a:pos x="connsiteX4" y="connsiteY4"/>
+              </a:cxn>
+              <a:cxn ang="0">
+                <a:pos x="connsiteX5" y="connsiteY5"/>
+              </a:cxn>
+              <a:cxn ang="0">
+                <a:pos x="connsiteX6" y="connsiteY6"/>
+              </a:cxn>
+              <a:cxn ang="0">
+                <a:pos x="connsiteX7" y="connsiteY7"/>
+              </a:cxn>
+              <a:cxn ang="0">
+                <a:pos x="connsiteX8" y="connsiteY8"/>
+              </a:cxn>
+              <a:cxn ang="0">
+                <a:pos x="connsiteX9" y="connsiteY9"/>
+              </a:cxn>
+              <a:cxn ang="0">
+                <a:pos x="connsiteX10" y="connsiteY10"/>
+              </a:cxn>
+              <a:cxn ang="0">
+                <a:pos x="connsiteX11" y="connsiteY11"/>
+              </a:cxn>
+              <a:cxn ang="0">
+                <a:pos x="connsiteX12" y="connsiteY12"/>
+              </a:cxn>
+              <a:cxn ang="0">
+                <a:pos x="connsiteX13" y="connsiteY13"/>
+              </a:cxn>
+              <a:cxn ang="0">
+                <a:pos x="connsiteX14" y="connsiteY14"/>
+              </a:cxn>
+            </a:cxnLst>
+            <a:rect l="l" t="t" r="r" b="b"/>
+            <a:pathLst>
+              <a:path w="2307432" h="616744">
+                <a:moveTo>
+                  <a:pt x="2307432" y="616744"/>
+                </a:moveTo>
+                <a:cubicBezTo>
+                  <a:pt x="2234605" y="605433"/>
+                  <a:pt x="2161779" y="594123"/>
+                  <a:pt x="2135982" y="535782"/>
+                </a:cubicBezTo>
+                <a:cubicBezTo>
+                  <a:pt x="2110185" y="477441"/>
+                  <a:pt x="2209403" y="291703"/>
+                  <a:pt x="2152650" y="266700"/>
+                </a:cubicBezTo>
+                <a:cubicBezTo>
+                  <a:pt x="2095897" y="241697"/>
+                  <a:pt x="1873647" y="408385"/>
+                  <a:pt x="1795463" y="385763"/>
+                </a:cubicBezTo>
+                <a:cubicBezTo>
+                  <a:pt x="1717279" y="363141"/>
+                  <a:pt x="1743075" y="141288"/>
+                  <a:pt x="1683544" y="130969"/>
+                </a:cubicBezTo>
+                <a:cubicBezTo>
+                  <a:pt x="1624013" y="120650"/>
+                  <a:pt x="1495028" y="336947"/>
+                  <a:pt x="1438275" y="323850"/>
+                </a:cubicBezTo>
+                <a:cubicBezTo>
+                  <a:pt x="1381522" y="310753"/>
+                  <a:pt x="1400969" y="56753"/>
+                  <a:pt x="1343025" y="52388"/>
+                </a:cubicBezTo>
+                <a:cubicBezTo>
+                  <a:pt x="1285081" y="48022"/>
+                  <a:pt x="1149350" y="300038"/>
+                  <a:pt x="1090613" y="297657"/>
+                </a:cubicBezTo>
+                <a:cubicBezTo>
+                  <a:pt x="1031876" y="295276"/>
+                  <a:pt x="1039019" y="44450"/>
+                  <a:pt x="990600" y="38100"/>
+                </a:cubicBezTo>
+                <a:cubicBezTo>
+                  <a:pt x="942181" y="31750"/>
+                  <a:pt x="848122" y="265510"/>
+                  <a:pt x="800100" y="259557"/>
+                </a:cubicBezTo>
+                <a:cubicBezTo>
+                  <a:pt x="752078" y="253604"/>
+                  <a:pt x="754063" y="3176"/>
+                  <a:pt x="702469" y="2382"/>
+                </a:cubicBezTo>
+                <a:cubicBezTo>
+                  <a:pt x="650875" y="1588"/>
+                  <a:pt x="556022" y="250825"/>
+                  <a:pt x="490538" y="254794"/>
+                </a:cubicBezTo>
+                <a:cubicBezTo>
+                  <a:pt x="425054" y="258763"/>
+                  <a:pt x="365522" y="25797"/>
+                  <a:pt x="309563" y="26194"/>
+                </a:cubicBezTo>
+                <a:cubicBezTo>
+                  <a:pt x="253604" y="26591"/>
+                  <a:pt x="206376" y="261541"/>
+                  <a:pt x="154782" y="257175"/>
+                </a:cubicBezTo>
+                <a:cubicBezTo>
+                  <a:pt x="103188" y="252809"/>
+                  <a:pt x="51594" y="126404"/>
+                  <a:pt x="0" y="0"/>
+                </a:cubicBezTo>
+              </a:path>
+            </a:pathLst>
+          </a:custGeom>
+          <a:noFill/>
+          <a:ln>
+            <a:solidFill>
+              <a:schemeClr val="accent1"/>
+            </a:solidFill>
+            <a:tailEnd type="triangle"/>
+          </a:ln>
+        </p:spPr>
+        <p:style>
+          <a:lnRef idx="2">
+            <a:schemeClr val="accent1">
+              <a:shade val="50000"/>
+            </a:schemeClr>
+          </a:lnRef>
+          <a:fillRef idx="1">
+            <a:schemeClr val="accent1"/>
+          </a:fillRef>
+          <a:effectRef idx="0">
+            <a:schemeClr val="accent1"/>
+          </a:effectRef>
+          <a:fontRef idx="minor">
+            <a:schemeClr val="lt1"/>
+          </a:fontRef>
+        </p:style>
+        <p:txBody>
+          <a:bodyPr rtlCol="0" anchor="ctr"/>
+          <a:lstStyle/>
+          <a:p>
+            <a:pPr algn="ctr"/>
+            <a:endParaRPr kumimoji="1" lang="ja-JP" altLang="en-US"/>
+          </a:p>
+        </p:txBody>
+      </p:sp>
+      <p:cxnSp>
+        <p:nvCxnSpPr>
+          <p:cNvPr id="25" name="直線コネクタ 24"/>
+          <p:cNvCxnSpPr/>
+          <p:nvPr/>
+        </p:nvCxnSpPr>
+        <p:spPr>
+          <a:xfrm flipV="1">
+            <a:off x="5192080" y="2398238"/>
+            <a:ext cx="360000" cy="0"/>
+          </a:xfrm>
+          <a:prstGeom prst="line">
+            <a:avLst/>
+          </a:prstGeom>
+          <a:ln w="12700"/>
+        </p:spPr>
+        <p:style>
+          <a:lnRef idx="1">
+            <a:schemeClr val="accent1"/>
+          </a:lnRef>
+          <a:fillRef idx="0">
+            <a:schemeClr val="accent1"/>
+          </a:fillRef>
+          <a:effectRef idx="0">
+            <a:schemeClr val="accent1"/>
+          </a:effectRef>
+          <a:fontRef idx="minor">
+            <a:schemeClr val="tx1"/>
+          </a:fontRef>
+        </p:style>
+      </p:cxnSp>
+      <p:sp>
+        <p:nvSpPr>
+          <p:cNvPr id="27" name="テキスト ボックス 26"/>
+          <p:cNvSpPr txBox="1"/>
+          <p:nvPr/>
+        </p:nvSpPr>
+        <p:spPr>
+          <a:xfrm>
+            <a:off x="5499888" y="2259739"/>
+            <a:ext cx="1222487" cy="276999"/>
+          </a:xfrm>
+          <a:prstGeom prst="rect">
+            <a:avLst/>
+          </a:prstGeom>
+          <a:noFill/>
+        </p:spPr>
+        <p:txBody>
+          <a:bodyPr wrap="square" rtlCol="0">
+            <a:spAutoFit/>
+          </a:bodyPr>
+          <a:lstStyle/>
+          <a:p>
+            <a:r>
+              <a:rPr kumimoji="1" lang="en-US" altLang="ja-JP" sz="1200" dirty="0" smtClean="0"/>
+              <a:t>Injection Beam</a:t>
+            </a:r>
+            <a:endParaRPr kumimoji="1" lang="ja-JP" altLang="en-US" sz="1200" dirty="0"/>
+          </a:p>
+        </p:txBody>
+      </p:sp>
+      <p:cxnSp>
+        <p:nvCxnSpPr>
+          <p:cNvPr id="28" name="直線コネクタ 27"/>
+          <p:cNvCxnSpPr/>
+          <p:nvPr/>
+        </p:nvCxnSpPr>
+        <p:spPr>
+          <a:xfrm flipV="1">
+            <a:off x="5192080" y="2576718"/>
+            <a:ext cx="360000" cy="0"/>
+          </a:xfrm>
+          <a:prstGeom prst="line">
+            <a:avLst/>
+          </a:prstGeom>
+          <a:ln w="12700">
+            <a:solidFill>
+              <a:srgbClr val="FFC000"/>
+            </a:solidFill>
+          </a:ln>
+        </p:spPr>
+        <p:style>
+          <a:lnRef idx="1">
+            <a:schemeClr val="accent1"/>
+          </a:lnRef>
+          <a:fillRef idx="0">
+            <a:schemeClr val="accent1"/>
+          </a:fillRef>
+          <a:effectRef idx="0">
+            <a:schemeClr val="accent1"/>
+          </a:effectRef>
+          <a:fontRef idx="minor">
+            <a:schemeClr val="tx1"/>
+          </a:fontRef>
+        </p:style>
+      </p:cxnSp>
+      <p:sp>
+        <p:nvSpPr>
+          <p:cNvPr id="29" name="テキスト ボックス 28"/>
+          <p:cNvSpPr txBox="1"/>
+          <p:nvPr/>
+        </p:nvSpPr>
+        <p:spPr>
+          <a:xfrm>
+            <a:off x="5499888" y="2433456"/>
+            <a:ext cx="1222487" cy="276999"/>
+          </a:xfrm>
+          <a:prstGeom prst="rect">
+            <a:avLst/>
+          </a:prstGeom>
+          <a:noFill/>
+        </p:spPr>
+        <p:txBody>
+          <a:bodyPr wrap="square" rtlCol="0">
+            <a:spAutoFit/>
+          </a:bodyPr>
+          <a:lstStyle/>
+          <a:p>
+            <a:r>
+              <a:rPr kumimoji="1" lang="en-US" altLang="ja-JP" sz="1200" dirty="0" smtClean="0"/>
+              <a:t>Stored Beam</a:t>
+            </a:r>
+            <a:endParaRPr kumimoji="1" lang="ja-JP" altLang="en-US" sz="1200" dirty="0"/>
+          </a:p>
+        </p:txBody>
+      </p:sp>
+      <mc:AlternateContent xmlns:mc="http://schemas.openxmlformats.org/markup-compatibility/2006">
+        <mc:Choice xmlns:a14="http://schemas.microsoft.com/office/drawing/2010/main" Requires="a14">
+          <p:sp>
+            <p:nvSpPr>
+              <p:cNvPr id="30" name="テキスト ボックス 29"/>
+              <p:cNvSpPr txBox="1"/>
+              <p:nvPr/>
+            </p:nvSpPr>
+            <p:spPr>
+              <a:xfrm>
+                <a:off x="3576261" y="3068538"/>
+                <a:ext cx="529070" cy="253916"/>
+              </a:xfrm>
+              <a:prstGeom prst="rect">
+                <a:avLst/>
+              </a:prstGeom>
+              <a:noFill/>
+            </p:spPr>
+            <p:txBody>
+              <a:bodyPr wrap="square" rtlCol="0">
+                <a:spAutoFit/>
+              </a:bodyPr>
+              <a:lstStyle/>
+              <a:p>
+                <a:pPr algn="ctr"/>
+                <a14:m>
+                  <m:oMathPara xmlns:m="http://schemas.openxmlformats.org/officeDocument/2006/math">
+                    <m:oMathParaPr>
+                      <m:jc m:val="centerGroup"/>
+                    </m:oMathParaPr>
+                    <m:oMath xmlns:m="http://schemas.openxmlformats.org/officeDocument/2006/math">
+                      <m:sSub>
+                        <m:sSubPr>
+                          <m:ctrlPr>
+                            <a:rPr kumimoji="1" lang="en-US" altLang="ja-JP" sz="1050" b="0" i="1" smtClean="0">
+                              <a:latin typeface="Cambria Math" panose="02040503050406030204" pitchFamily="18" charset="0"/>
+                            </a:rPr>
+                          </m:ctrlPr>
+                        </m:sSubPr>
+                        <m:e>
+                          <m:r>
+                            <a:rPr kumimoji="1" lang="en-US" altLang="ja-JP" sz="1050" b="0" i="1" smtClean="0">
+                              <a:latin typeface="Cambria Math" panose="02040503050406030204" pitchFamily="18" charset="0"/>
+                            </a:rPr>
+                            <m:t>𝑥</m:t>
+                          </m:r>
+                        </m:e>
+                        <m:sub>
+                          <m:r>
+                            <a:rPr kumimoji="1" lang="en-US" altLang="ja-JP" sz="1050" b="0" i="1" smtClean="0">
+                              <a:latin typeface="Cambria Math" panose="02040503050406030204" pitchFamily="18" charset="0"/>
+                            </a:rPr>
+                            <m:t>1</m:t>
+                          </m:r>
+                        </m:sub>
+                      </m:sSub>
+                    </m:oMath>
+                  </m:oMathPara>
+                </a14:m>
+                <a:endParaRPr kumimoji="1" lang="ja-JP" altLang="en-US" dirty="0"/>
+              </a:p>
+            </p:txBody>
+          </p:sp>
+        </mc:Choice>
+        <mc:Fallback>
+          <p:sp>
+            <p:nvSpPr>
+              <p:cNvPr id="30" name="テキスト ボックス 29"/>
+              <p:cNvSpPr txBox="1">
+                <a:spLocks noRot="1" noChangeAspect="1" noMove="1" noResize="1" noEditPoints="1" noAdjustHandles="1" noChangeArrowheads="1" noChangeShapeType="1" noTextEdit="1"/>
+              </p:cNvSpPr>
+              <p:nvPr/>
+            </p:nvSpPr>
+            <p:spPr>
+              <a:xfrm>
+                <a:off x="3576261" y="3068538"/>
+                <a:ext cx="529070" cy="253916"/>
+              </a:xfrm>
+              <a:prstGeom prst="rect">
+                <a:avLst/>
+              </a:prstGeom>
+              <a:blipFill rotWithShape="0">
+                <a:blip r:embed="rId2"/>
+                <a:stretch>
+                  <a:fillRect/>
+                </a:stretch>
+              </a:blipFill>
+            </p:spPr>
+            <p:txBody>
+              <a:bodyPr/>
+              <a:lstStyle/>
+              <a:p>
+                <a:r>
+                  <a:rPr lang="ja-JP" altLang="en-US">
+                    <a:noFill/>
+                  </a:rPr>
+                  <a:t> </a:t>
+                </a:r>
+              </a:p>
+            </p:txBody>
+          </p:sp>
+        </mc:Fallback>
+      </mc:AlternateContent>
+      <mc:AlternateContent xmlns:mc="http://schemas.openxmlformats.org/markup-compatibility/2006">
+        <mc:Choice xmlns:a14="http://schemas.microsoft.com/office/drawing/2010/main" Requires="a14">
+          <p:sp>
+            <p:nvSpPr>
+              <p:cNvPr id="31" name="テキスト ボックス 30"/>
+              <p:cNvSpPr txBox="1"/>
+              <p:nvPr/>
+            </p:nvSpPr>
+            <p:spPr>
+              <a:xfrm>
+                <a:off x="2852055" y="3300289"/>
+                <a:ext cx="1078693" cy="603563"/>
+              </a:xfrm>
+              <a:prstGeom prst="rect">
+                <a:avLst/>
+              </a:prstGeom>
+              <a:noFill/>
+            </p:spPr>
+            <p:txBody>
+              <a:bodyPr wrap="none" lIns="0" tIns="0" rIns="0" bIns="0" rtlCol="0">
+                <a:spAutoFit/>
+              </a:bodyPr>
+              <a:lstStyle/>
+              <a:p>
+                <a14:m>
+                  <m:oMathPara xmlns:m="http://schemas.openxmlformats.org/officeDocument/2006/math">
+                    <m:oMathParaPr>
+                      <m:jc m:val="centerGroup"/>
+                    </m:oMathParaPr>
+                    <m:oMath xmlns:m="http://schemas.openxmlformats.org/officeDocument/2006/math">
+                      <m:d>
+                        <m:dPr>
+                          <m:ctrlPr>
+                            <a:rPr kumimoji="1" lang="en-US" altLang="ja-JP" sz="1050" i="1" smtClean="0">
+                              <a:latin typeface="Cambria Math" panose="02040503050406030204" pitchFamily="18" charset="0"/>
+                            </a:rPr>
+                          </m:ctrlPr>
+                        </m:dPr>
+                        <m:e>
+                          <m:m>
+                            <m:mPr>
+                              <m:mcs>
+                                <m:mc>
+                                  <m:mcPr>
+                                    <m:count m:val="1"/>
+                                    <m:mcJc m:val="center"/>
+                                  </m:mcPr>
+                                </m:mc>
+                              </m:mcs>
+                              <m:ctrlPr>
+                                <a:rPr kumimoji="1" lang="en-US" altLang="ja-JP" sz="1050" i="1" smtClean="0">
+                                  <a:latin typeface="Cambria Math" panose="02040503050406030204" pitchFamily="18" charset="0"/>
+                                </a:rPr>
+                              </m:ctrlPr>
+                            </m:mPr>
+                            <m:mr>
+                              <m:e>
+                                <m:r>
+                                  <m:rPr>
+                                    <m:brk m:alnAt="7"/>
+                                  </m:rPr>
+                                  <a:rPr kumimoji="1" lang="en-US" altLang="ja-JP" sz="1050" b="0" i="1" smtClean="0">
+                                    <a:latin typeface="Cambria Math" panose="02040503050406030204" pitchFamily="18" charset="0"/>
+                                  </a:rPr>
+                                  <m:t>𝑥</m:t>
+                                </m:r>
+                              </m:e>
+                            </m:mr>
+                            <m:mr>
+                              <m:e>
+                                <m:sSup>
+                                  <m:sSupPr>
+                                    <m:ctrlPr>
+                                      <a:rPr kumimoji="1" lang="en-US" altLang="ja-JP" sz="1050" b="0" i="1" smtClean="0">
+                                        <a:latin typeface="Cambria Math" panose="02040503050406030204" pitchFamily="18" charset="0"/>
+                                      </a:rPr>
+                                    </m:ctrlPr>
+                                  </m:sSupPr>
+                                  <m:e>
+                                    <m:r>
+                                      <a:rPr kumimoji="1" lang="en-US" altLang="ja-JP" sz="1050" b="0" i="1" smtClean="0">
+                                        <a:latin typeface="Cambria Math" panose="02040503050406030204" pitchFamily="18" charset="0"/>
+                                      </a:rPr>
+                                      <m:t>𝑥</m:t>
+                                    </m:r>
+                                  </m:e>
+                                  <m:sup>
+                                    <m:r>
+                                      <a:rPr kumimoji="1" lang="en-US" altLang="ja-JP" sz="1050" b="0" i="1" smtClean="0">
+                                        <a:latin typeface="Cambria Math" panose="02040503050406030204" pitchFamily="18" charset="0"/>
+                                      </a:rPr>
+                                      <m:t>′</m:t>
+                                    </m:r>
+                                  </m:sup>
+                                </m:sSup>
+                              </m:e>
+                            </m:mr>
+                          </m:m>
+                        </m:e>
+                      </m:d>
+                      <m:r>
+                        <a:rPr kumimoji="1" lang="en-US" altLang="ja-JP" sz="1050" b="0" i="1" smtClean="0">
+                          <a:latin typeface="Cambria Math" panose="02040503050406030204" pitchFamily="18" charset="0"/>
+                        </a:rPr>
+                        <m:t>=</m:t>
+                      </m:r>
+                      <m:d>
+                        <m:dPr>
+                          <m:ctrlPr>
+                            <a:rPr kumimoji="1" lang="en-US" altLang="ja-JP" sz="1050" b="0" i="1" smtClean="0">
+                              <a:latin typeface="Cambria Math" panose="02040503050406030204" pitchFamily="18" charset="0"/>
+                            </a:rPr>
+                          </m:ctrlPr>
+                        </m:dPr>
+                        <m:e>
+                          <m:m>
+                            <m:mPr>
+                              <m:mcs>
+                                <m:mc>
+                                  <m:mcPr>
+                                    <m:count m:val="1"/>
+                                    <m:mcJc m:val="center"/>
+                                  </m:mcPr>
+                                </m:mc>
+                              </m:mcs>
+                              <m:ctrlPr>
+                                <a:rPr kumimoji="1" lang="en-US" altLang="ja-JP" sz="1050" b="0" i="1" smtClean="0">
+                                  <a:latin typeface="Cambria Math" panose="02040503050406030204" pitchFamily="18" charset="0"/>
+                                </a:rPr>
+                              </m:ctrlPr>
+                            </m:mPr>
+                            <m:mr>
+                              <m:e>
+                                <m:f>
+                                  <m:fPr>
+                                    <m:ctrlPr>
+                                      <a:rPr kumimoji="1" lang="en-US" altLang="ja-JP" sz="1050" b="0" i="1" smtClean="0">
+                                        <a:latin typeface="Cambria Math" panose="02040503050406030204" pitchFamily="18" charset="0"/>
+                                      </a:rPr>
+                                    </m:ctrlPr>
+                                  </m:fPr>
+                                  <m:num>
+                                    <m:sSub>
+                                      <m:sSubPr>
+                                        <m:ctrlPr>
+                                          <a:rPr lang="en-US" altLang="ja-JP" sz="1050" i="1">
+                                            <a:latin typeface="Cambria Math" panose="02040503050406030204" pitchFamily="18" charset="0"/>
+                                          </a:rPr>
+                                        </m:ctrlPr>
+                                      </m:sSubPr>
+                                      <m:e>
+                                        <m:r>
+                                          <m:rPr>
+                                            <m:brk m:alnAt="7"/>
+                                          </m:rPr>
+                                          <a:rPr lang="en-US" altLang="ja-JP" sz="1050" i="1">
+                                            <a:latin typeface="Cambria Math" panose="02040503050406030204" pitchFamily="18" charset="0"/>
+                                          </a:rPr>
+                                          <m:t>𝑥</m:t>
+                                        </m:r>
+                                      </m:e>
+                                      <m:sub>
+                                        <m:r>
+                                          <m:rPr>
+                                            <m:brk m:alnAt="7"/>
+                                          </m:rPr>
+                                          <a:rPr lang="en-US" altLang="ja-JP" sz="1050" i="1">
+                                            <a:latin typeface="Cambria Math" panose="02040503050406030204" pitchFamily="18" charset="0"/>
+                                          </a:rPr>
+                                          <m:t>1</m:t>
+                                        </m:r>
+                                      </m:sub>
+                                    </m:sSub>
+                                    <m:r>
+                                      <m:rPr>
+                                        <m:brk m:alnAt="7"/>
+                                      </m:rPr>
+                                      <a:rPr lang="en-US" altLang="ja-JP" sz="1050" i="1">
+                                        <a:latin typeface="Cambria Math" panose="02040503050406030204" pitchFamily="18" charset="0"/>
+                                      </a:rPr>
+                                      <m:t>+</m:t>
+                                    </m:r>
+                                    <m:sSub>
+                                      <m:sSubPr>
+                                        <m:ctrlPr>
+                                          <a:rPr kumimoji="1" lang="en-US" altLang="ja-JP" sz="1050" b="0" i="1" smtClean="0">
+                                            <a:latin typeface="Cambria Math" panose="02040503050406030204" pitchFamily="18" charset="0"/>
+                                          </a:rPr>
+                                        </m:ctrlPr>
+                                      </m:sSubPr>
+                                      <m:e>
+                                        <m:r>
+                                          <m:rPr>
+                                            <m:brk m:alnAt="7"/>
+                                          </m:rPr>
+                                          <a:rPr kumimoji="1" lang="en-US" altLang="ja-JP" sz="1050" b="0" i="1" smtClean="0">
+                                            <a:latin typeface="Cambria Math" panose="02040503050406030204" pitchFamily="18" charset="0"/>
+                                          </a:rPr>
+                                          <m:t>𝑥</m:t>
+                                        </m:r>
+                                      </m:e>
+                                      <m:sub>
+                                        <m:r>
+                                          <m:rPr>
+                                            <m:brk m:alnAt="7"/>
+                                          </m:rPr>
+                                          <a:rPr kumimoji="1" lang="en-US" altLang="ja-JP" sz="1050" b="0" i="1" smtClean="0">
+                                            <a:latin typeface="Cambria Math" panose="02040503050406030204" pitchFamily="18" charset="0"/>
+                                          </a:rPr>
+                                          <m:t>2</m:t>
+                                        </m:r>
+                                      </m:sub>
+                                    </m:sSub>
+                                  </m:num>
+                                  <m:den>
+                                    <m:r>
+                                      <m:rPr>
+                                        <m:brk m:alnAt="7"/>
+                                      </m:rPr>
+                                      <a:rPr kumimoji="1" lang="en-US" altLang="ja-JP" sz="1050" b="0" i="1" smtClean="0">
+                                        <a:latin typeface="Cambria Math" panose="02040503050406030204" pitchFamily="18" charset="0"/>
+                                      </a:rPr>
+                                      <m:t>2</m:t>
+                                    </m:r>
+                                  </m:den>
+                                </m:f>
+                              </m:e>
+                            </m:mr>
+                            <m:mr>
+                              <m:e>
+                                <m:f>
+                                  <m:fPr>
+                                    <m:ctrlPr>
+                                      <a:rPr lang="en-US" altLang="ja-JP" sz="1050" i="1">
+                                        <a:latin typeface="Cambria Math" panose="02040503050406030204" pitchFamily="18" charset="0"/>
+                                      </a:rPr>
+                                    </m:ctrlPr>
+                                  </m:fPr>
+                                  <m:num>
+                                    <m:sSub>
+                                      <m:sSubPr>
+                                        <m:ctrlPr>
+                                          <a:rPr lang="en-US" altLang="ja-JP" sz="1050" i="1">
+                                            <a:latin typeface="Cambria Math" panose="02040503050406030204" pitchFamily="18" charset="0"/>
+                                          </a:rPr>
+                                        </m:ctrlPr>
+                                      </m:sSubPr>
+                                      <m:e>
+                                        <m:r>
+                                          <m:rPr>
+                                            <m:brk m:alnAt="7"/>
+                                          </m:rPr>
+                                          <a:rPr lang="en-US" altLang="ja-JP" sz="1050" i="1">
+                                            <a:latin typeface="Cambria Math" panose="02040503050406030204" pitchFamily="18" charset="0"/>
+                                          </a:rPr>
+                                          <m:t>𝑥</m:t>
+                                        </m:r>
+                                      </m:e>
+                                      <m:sub>
+                                        <m:r>
+                                          <a:rPr lang="en-US" altLang="ja-JP" sz="1050" b="0" i="1" smtClean="0">
+                                            <a:latin typeface="Cambria Math" panose="02040503050406030204" pitchFamily="18" charset="0"/>
+                                          </a:rPr>
+                                          <m:t>2</m:t>
+                                        </m:r>
+                                      </m:sub>
+                                    </m:sSub>
+                                    <m:r>
+                                      <a:rPr lang="en-US" altLang="ja-JP" sz="1050" b="0" i="1" smtClean="0">
+                                        <a:latin typeface="Cambria Math" panose="02040503050406030204" pitchFamily="18" charset="0"/>
+                                      </a:rPr>
+                                      <m:t>−</m:t>
+                                    </m:r>
+                                    <m:sSub>
+                                      <m:sSubPr>
+                                        <m:ctrlPr>
+                                          <a:rPr lang="en-US" altLang="ja-JP" sz="1050" i="1">
+                                            <a:latin typeface="Cambria Math" panose="02040503050406030204" pitchFamily="18" charset="0"/>
+                                          </a:rPr>
+                                        </m:ctrlPr>
+                                      </m:sSubPr>
+                                      <m:e>
+                                        <m:r>
+                                          <m:rPr>
+                                            <m:brk m:alnAt="7"/>
+                                          </m:rPr>
+                                          <a:rPr lang="en-US" altLang="ja-JP" sz="1050" i="1">
+                                            <a:latin typeface="Cambria Math" panose="02040503050406030204" pitchFamily="18" charset="0"/>
+                                          </a:rPr>
+                                          <m:t>𝑥</m:t>
+                                        </m:r>
+                                      </m:e>
+                                      <m:sub>
+                                        <m:r>
+                                          <a:rPr lang="en-US" altLang="ja-JP" sz="1050" b="0" i="1" smtClean="0">
+                                            <a:latin typeface="Cambria Math" panose="02040503050406030204" pitchFamily="18" charset="0"/>
+                                          </a:rPr>
+                                          <m:t>1</m:t>
+                                        </m:r>
+                                      </m:sub>
+                                    </m:sSub>
+                                  </m:num>
+                                  <m:den>
+                                    <m:r>
+                                      <a:rPr lang="en-US" altLang="ja-JP" sz="1050" b="0" i="1" smtClean="0">
+                                        <a:latin typeface="Cambria Math" panose="02040503050406030204" pitchFamily="18" charset="0"/>
+                                      </a:rPr>
+                                      <m:t>𝑙</m:t>
+                                    </m:r>
+                                  </m:den>
+                                </m:f>
+                              </m:e>
+                            </m:mr>
+                          </m:m>
+                        </m:e>
+                      </m:d>
+                    </m:oMath>
+                  </m:oMathPara>
+                </a14:m>
+                <a:endParaRPr kumimoji="1" lang="ja-JP" altLang="en-US" sz="1050" dirty="0"/>
+              </a:p>
+            </p:txBody>
+          </p:sp>
+        </mc:Choice>
+        <mc:Fallback>
+          <p:sp>
+            <p:nvSpPr>
+              <p:cNvPr id="31" name="テキスト ボックス 30"/>
+              <p:cNvSpPr txBox="1">
+                <a:spLocks noRot="1" noChangeAspect="1" noMove="1" noResize="1" noEditPoints="1" noAdjustHandles="1" noChangeArrowheads="1" noChangeShapeType="1" noTextEdit="1"/>
+              </p:cNvSpPr>
+              <p:nvPr/>
+            </p:nvSpPr>
+            <p:spPr>
+              <a:xfrm>
+                <a:off x="2852055" y="3300289"/>
+                <a:ext cx="1078693" cy="603563"/>
+              </a:xfrm>
+              <a:prstGeom prst="rect">
+                <a:avLst/>
+              </a:prstGeom>
+              <a:blipFill rotWithShape="0">
+                <a:blip r:embed="rId3"/>
+                <a:stretch>
+                  <a:fillRect/>
+                </a:stretch>
+              </a:blipFill>
+            </p:spPr>
+            <p:txBody>
+              <a:bodyPr/>
+              <a:lstStyle/>
+              <a:p>
+                <a:r>
+                  <a:rPr lang="ja-JP" altLang="en-US">
+                    <a:noFill/>
+                  </a:rPr>
+                  <a:t> </a:t>
+                </a:r>
+              </a:p>
+            </p:txBody>
+          </p:sp>
+        </mc:Fallback>
+      </mc:AlternateContent>
+      <p:sp>
+        <p:nvSpPr>
+          <p:cNvPr id="19" name="対角する 2 つの角を切り取った四角形 18"/>
+          <p:cNvSpPr/>
+          <p:nvPr/>
+        </p:nvSpPr>
+        <p:spPr>
+          <a:xfrm>
+            <a:off x="2949688" y="2891127"/>
+            <a:ext cx="565423" cy="261796"/>
+          </a:xfrm>
+          <a:prstGeom prst="snip2DiagRect">
+            <a:avLst>
+              <a:gd name="adj1" fmla="val 32434"/>
+              <a:gd name="adj2" fmla="val 36825"/>
+            </a:avLst>
+          </a:prstGeom>
+          <a:noFill/>
+          <a:ln w="9525">
+            <a:solidFill>
+              <a:schemeClr val="tx1"/>
+            </a:solidFill>
+          </a:ln>
+          <a:scene3d>
+            <a:camera prst="orthographicFront">
+              <a:rot lat="0" lon="14999963" rev="0"/>
+            </a:camera>
+            <a:lightRig rig="threePt" dir="t"/>
+          </a:scene3d>
+        </p:spPr>
+        <p:style>
+          <a:lnRef idx="2">
+            <a:schemeClr val="accent1">
+              <a:shade val="50000"/>
+            </a:schemeClr>
+          </a:lnRef>
+          <a:fillRef idx="1">
+            <a:schemeClr val="accent1"/>
+          </a:fillRef>
+          <a:effectRef idx="0">
+            <a:schemeClr val="accent1"/>
+          </a:effectRef>
+          <a:fontRef idx="minor">
+            <a:schemeClr val="lt1"/>
+          </a:fontRef>
+        </p:style>
+        <p:txBody>
+          <a:bodyPr rtlCol="0" anchor="ctr"/>
+          <a:lstStyle/>
+          <a:p>
+            <a:pPr algn="ctr"/>
+            <a:endParaRPr kumimoji="1" lang="ja-JP" altLang="en-US"/>
+          </a:p>
+        </p:txBody>
+      </p:sp>
+      <p:cxnSp>
+        <p:nvCxnSpPr>
+          <p:cNvPr id="34" name="直線矢印コネクタ 33"/>
+          <p:cNvCxnSpPr/>
+          <p:nvPr/>
+        </p:nvCxnSpPr>
+        <p:spPr>
+          <a:xfrm>
+            <a:off x="3231612" y="2800220"/>
+            <a:ext cx="563848" cy="0"/>
+          </a:xfrm>
+          <a:prstGeom prst="straightConnector1">
+            <a:avLst/>
+          </a:prstGeom>
+          <a:ln>
+            <a:solidFill>
+              <a:schemeClr val="tx1"/>
+            </a:solidFill>
+            <a:headEnd type="triangle"/>
+            <a:tailEnd type="triangle"/>
+          </a:ln>
+        </p:spPr>
+        <p:style>
+          <a:lnRef idx="1">
+            <a:schemeClr val="accent1"/>
+          </a:lnRef>
+          <a:fillRef idx="0">
+            <a:schemeClr val="accent1"/>
+          </a:fillRef>
+          <a:effectRef idx="0">
+            <a:schemeClr val="accent1"/>
+          </a:effectRef>
+          <a:fontRef idx="minor">
+            <a:schemeClr val="tx1"/>
+          </a:fontRef>
+        </p:style>
+      </p:cxnSp>
+      <mc:AlternateContent xmlns:mc="http://schemas.openxmlformats.org/markup-compatibility/2006">
+        <mc:Choice xmlns:a14="http://schemas.microsoft.com/office/drawing/2010/main" Requires="a14">
+          <p:sp>
+            <p:nvSpPr>
+              <p:cNvPr id="35" name="テキスト ボックス 34"/>
+              <p:cNvSpPr txBox="1"/>
+              <p:nvPr/>
+            </p:nvSpPr>
+            <p:spPr>
+              <a:xfrm>
+                <a:off x="3379467" y="2578599"/>
+                <a:ext cx="301332" cy="253916"/>
+              </a:xfrm>
+              <a:prstGeom prst="rect">
+                <a:avLst/>
+              </a:prstGeom>
+              <a:noFill/>
+            </p:spPr>
+            <p:txBody>
+              <a:bodyPr wrap="square" rtlCol="0">
+                <a:spAutoFit/>
+              </a:bodyPr>
+              <a:lstStyle/>
+              <a:p>
+                <a:pPr algn="ctr"/>
+                <a14:m>
+                  <m:oMathPara xmlns:m="http://schemas.openxmlformats.org/officeDocument/2006/math">
+                    <m:oMathParaPr>
+                      <m:jc m:val="centerGroup"/>
+                    </m:oMathParaPr>
+                    <m:oMath xmlns:m="http://schemas.openxmlformats.org/officeDocument/2006/math">
+                      <m:r>
+                        <a:rPr kumimoji="1" lang="en-US" altLang="ja-JP" sz="1050" i="1" dirty="0" smtClean="0">
+                          <a:latin typeface="Cambria Math" panose="02040503050406030204" pitchFamily="18" charset="0"/>
+                        </a:rPr>
+                        <m:t>𝑙</m:t>
+                      </m:r>
+                    </m:oMath>
+                  </m:oMathPara>
+                </a14:m>
+                <a:endParaRPr kumimoji="1" lang="ja-JP" altLang="en-US" dirty="0"/>
+              </a:p>
+            </p:txBody>
+          </p:sp>
+        </mc:Choice>
+        <mc:Fallback>
+          <p:sp>
+            <p:nvSpPr>
+              <p:cNvPr id="35" name="テキスト ボックス 34"/>
+              <p:cNvSpPr txBox="1">
+                <a:spLocks noRot="1" noChangeAspect="1" noMove="1" noResize="1" noEditPoints="1" noAdjustHandles="1" noChangeArrowheads="1" noChangeShapeType="1" noTextEdit="1"/>
+              </p:cNvSpPr>
+              <p:nvPr/>
+            </p:nvSpPr>
+            <p:spPr>
+              <a:xfrm>
+                <a:off x="3379467" y="2578599"/>
+                <a:ext cx="301332" cy="253916"/>
+              </a:xfrm>
+              <a:prstGeom prst="rect">
+                <a:avLst/>
+              </a:prstGeom>
+              <a:blipFill rotWithShape="0">
+                <a:blip r:embed="rId4"/>
+                <a:stretch>
+                  <a:fillRect/>
+                </a:stretch>
+              </a:blipFill>
+            </p:spPr>
+            <p:txBody>
+              <a:bodyPr/>
+              <a:lstStyle/>
+              <a:p>
+                <a:r>
+                  <a:rPr lang="ja-JP" altLang="en-US">
+                    <a:noFill/>
+                  </a:rPr>
+                  <a:t> </a:t>
+                </a:r>
+              </a:p>
+            </p:txBody>
+          </p:sp>
+        </mc:Fallback>
+      </mc:AlternateContent>
+      <p:sp>
+        <p:nvSpPr>
+          <p:cNvPr id="36" name="正方形/長方形 35"/>
+          <p:cNvSpPr/>
+          <p:nvPr/>
+        </p:nvSpPr>
+        <p:spPr>
+          <a:xfrm>
+            <a:off x="3666335" y="2296148"/>
+            <a:ext cx="625492" cy="369332"/>
+          </a:xfrm>
+          <a:prstGeom prst="rect">
+            <a:avLst/>
+          </a:prstGeom>
+        </p:spPr>
+        <p:txBody>
+          <a:bodyPr wrap="none">
+            <a:spAutoFit/>
+          </a:bodyPr>
+          <a:lstStyle/>
+          <a:p>
+            <a:pPr algn="ctr"/>
+            <a:r>
+              <a:rPr lang="en-US" altLang="ja-JP" dirty="0"/>
+              <a:t>BPM</a:t>
+            </a:r>
+          </a:p>
+        </p:txBody>
+      </p:sp>
+      <mc:AlternateContent xmlns:mc="http://schemas.openxmlformats.org/markup-compatibility/2006">
+        <mc:Choice xmlns:a14="http://schemas.microsoft.com/office/drawing/2010/main" Requires="a14">
+          <p:sp>
+            <p:nvSpPr>
+              <p:cNvPr id="37" name="正方形/長方形 36"/>
+              <p:cNvSpPr/>
+              <p:nvPr/>
+            </p:nvSpPr>
+            <p:spPr>
+              <a:xfrm>
+                <a:off x="3064300" y="3059789"/>
+                <a:ext cx="372345" cy="276999"/>
+              </a:xfrm>
+              <a:prstGeom prst="rect">
+                <a:avLst/>
+              </a:prstGeom>
+            </p:spPr>
+            <p:txBody>
+              <a:bodyPr wrap="none">
+                <a:spAutoFit/>
+              </a:bodyPr>
+              <a:lstStyle/>
+              <a:p>
+                <a14:m>
+                  <m:oMathPara xmlns:m="http://schemas.openxmlformats.org/officeDocument/2006/math">
+                    <m:oMathParaPr>
+                      <m:jc m:val="centerGroup"/>
+                    </m:oMathParaPr>
+                    <m:oMath xmlns:m="http://schemas.openxmlformats.org/officeDocument/2006/math">
+                      <m:sSub>
+                        <m:sSubPr>
+                          <m:ctrlPr>
+                            <a:rPr lang="en-US" altLang="ja-JP" sz="1200" i="1">
+                              <a:latin typeface="Cambria Math" panose="02040503050406030204" pitchFamily="18" charset="0"/>
+                            </a:rPr>
+                          </m:ctrlPr>
+                        </m:sSubPr>
+                        <m:e>
+                          <m:r>
+                            <a:rPr lang="en-US" altLang="ja-JP" sz="1200" i="1">
+                              <a:latin typeface="Cambria Math" panose="02040503050406030204" pitchFamily="18" charset="0"/>
+                            </a:rPr>
+                            <m:t>𝑥</m:t>
+                          </m:r>
+                        </m:e>
+                        <m:sub>
+                          <m:r>
+                            <a:rPr lang="en-US" altLang="ja-JP" sz="1200" i="1">
+                              <a:latin typeface="Cambria Math" panose="02040503050406030204" pitchFamily="18" charset="0"/>
+                            </a:rPr>
+                            <m:t>2</m:t>
+                          </m:r>
+                        </m:sub>
+                      </m:sSub>
+                    </m:oMath>
+                  </m:oMathPara>
+                </a14:m>
+                <a:endParaRPr lang="ja-JP" altLang="en-US" sz="1200" dirty="0"/>
+              </a:p>
+            </p:txBody>
+          </p:sp>
+        </mc:Choice>
+        <mc:Fallback>
+          <p:sp>
+            <p:nvSpPr>
+              <p:cNvPr id="37" name="正方形/長方形 36"/>
+              <p:cNvSpPr>
+                <a:spLocks noRot="1" noChangeAspect="1" noMove="1" noResize="1" noEditPoints="1" noAdjustHandles="1" noChangeArrowheads="1" noChangeShapeType="1" noTextEdit="1"/>
+              </p:cNvSpPr>
+              <p:nvPr/>
+            </p:nvSpPr>
+            <p:spPr>
+              <a:xfrm>
+                <a:off x="3064300" y="3059789"/>
+                <a:ext cx="372345" cy="276999"/>
+              </a:xfrm>
+              <a:prstGeom prst="rect">
+                <a:avLst/>
+              </a:prstGeom>
+              <a:blipFill rotWithShape="0">
+                <a:blip r:embed="rId5"/>
+                <a:stretch>
+                  <a:fillRect/>
+                </a:stretch>
+              </a:blipFill>
+            </p:spPr>
+            <p:txBody>
+              <a:bodyPr/>
+              <a:lstStyle/>
+              <a:p>
+                <a:r>
+                  <a:rPr lang="ja-JP" altLang="en-US">
+                    <a:noFill/>
+                  </a:rPr>
+                  <a:t> </a:t>
+                </a:r>
+              </a:p>
+            </p:txBody>
+          </p:sp>
+        </mc:Fallback>
+      </mc:AlternateContent>
+      <p:cxnSp>
+        <p:nvCxnSpPr>
+          <p:cNvPr id="13" name="直線コネクタ 12"/>
+          <p:cNvCxnSpPr>
+            <a:stCxn id="4" idx="6"/>
+          </p:cNvCxnSpPr>
+          <p:nvPr/>
+        </p:nvCxnSpPr>
+        <p:spPr>
+          <a:xfrm>
+            <a:off x="5201606" y="3483923"/>
+            <a:ext cx="1168188" cy="1048138"/>
+          </a:xfrm>
+          <a:prstGeom prst="line">
+            <a:avLst/>
+          </a:prstGeom>
+          <a:ln>
+            <a:solidFill>
+              <a:schemeClr val="tx1"/>
+            </a:solidFill>
+            <a:prstDash val="sysDash"/>
+            <a:headEnd type="arrow"/>
+            <a:tailEnd type="none"/>
+          </a:ln>
+        </p:spPr>
+        <p:style>
+          <a:lnRef idx="1">
+            <a:schemeClr val="accent1"/>
+          </a:lnRef>
+          <a:fillRef idx="0">
+            <a:schemeClr val="accent1"/>
+          </a:fillRef>
+          <a:effectRef idx="0">
+            <a:schemeClr val="accent1"/>
+          </a:effectRef>
+          <a:fontRef idx="minor">
+            <a:schemeClr val="tx1"/>
+          </a:fontRef>
+        </p:style>
+      </p:cxnSp>
+      <p:sp>
+        <p:nvSpPr>
+          <p:cNvPr id="42" name="直方体 41"/>
+          <p:cNvSpPr/>
+          <p:nvPr/>
+        </p:nvSpPr>
+        <p:spPr>
+          <a:xfrm>
+            <a:off x="5439149" y="3871833"/>
+            <a:ext cx="385766" cy="106220"/>
+          </a:xfrm>
+          <a:prstGeom prst="cube">
+            <a:avLst>
+              <a:gd name="adj" fmla="val 68983"/>
+            </a:avLst>
+          </a:prstGeom>
+          <a:solidFill>
+            <a:schemeClr val="bg1"/>
+          </a:solidFill>
+          <a:ln>
+            <a:solidFill>
+              <a:schemeClr val="tx1"/>
+            </a:solidFill>
+          </a:ln>
+        </p:spPr>
+        <p:style>
+          <a:lnRef idx="2">
+            <a:schemeClr val="accent1">
+              <a:shade val="50000"/>
+            </a:schemeClr>
+          </a:lnRef>
+          <a:fillRef idx="1">
+            <a:schemeClr val="accent1"/>
+          </a:fillRef>
+          <a:effectRef idx="0">
+            <a:schemeClr val="accent1"/>
+          </a:effectRef>
+          <a:fontRef idx="minor">
+            <a:schemeClr val="lt1"/>
+          </a:fontRef>
+        </p:style>
+        <p:txBody>
+          <a:bodyPr rtlCol="0" anchor="ctr"/>
+          <a:lstStyle/>
+          <a:p>
+            <a:pPr algn="ctr"/>
+            <a:endParaRPr kumimoji="1" lang="ja-JP" altLang="en-US"/>
+          </a:p>
+        </p:txBody>
+      </p:sp>
+      <p:sp>
+        <p:nvSpPr>
+          <p:cNvPr id="40" name="直方体 39"/>
+          <p:cNvSpPr/>
+          <p:nvPr/>
+        </p:nvSpPr>
+        <p:spPr>
+          <a:xfrm>
+            <a:off x="4624071" y="3818723"/>
+            <a:ext cx="385766" cy="106220"/>
+          </a:xfrm>
+          <a:prstGeom prst="cube">
+            <a:avLst>
+              <a:gd name="adj" fmla="val 68983"/>
+            </a:avLst>
+          </a:prstGeom>
+          <a:solidFill>
+            <a:schemeClr val="bg1"/>
+          </a:solidFill>
+          <a:ln>
+            <a:solidFill>
+              <a:schemeClr val="tx1"/>
+            </a:solidFill>
+          </a:ln>
+        </p:spPr>
+        <p:style>
+          <a:lnRef idx="2">
+            <a:schemeClr val="accent1">
+              <a:shade val="50000"/>
+            </a:schemeClr>
+          </a:lnRef>
+          <a:fillRef idx="1">
+            <a:schemeClr val="accent1"/>
+          </a:fillRef>
+          <a:effectRef idx="0">
+            <a:schemeClr val="accent1"/>
+          </a:effectRef>
+          <a:fontRef idx="minor">
+            <a:schemeClr val="lt1"/>
+          </a:fontRef>
+        </p:style>
+        <p:txBody>
+          <a:bodyPr rtlCol="0" anchor="ctr"/>
+          <a:lstStyle/>
+          <a:p>
+            <a:pPr algn="ctr"/>
+            <a:endParaRPr kumimoji="1" lang="ja-JP" altLang="en-US"/>
+          </a:p>
+        </p:txBody>
+      </p:sp>
+      <p:sp>
+        <p:nvSpPr>
+          <p:cNvPr id="41" name="直方体 40"/>
+          <p:cNvSpPr/>
+          <p:nvPr/>
+        </p:nvSpPr>
+        <p:spPr>
+          <a:xfrm>
+            <a:off x="5451269" y="3741190"/>
+            <a:ext cx="385766" cy="106220"/>
+          </a:xfrm>
+          <a:prstGeom prst="cube">
+            <a:avLst>
+              <a:gd name="adj" fmla="val 68983"/>
+            </a:avLst>
+          </a:prstGeom>
+          <a:solidFill>
+            <a:schemeClr val="bg1"/>
+          </a:solidFill>
+          <a:ln>
+            <a:solidFill>
+              <a:schemeClr val="tx1"/>
+            </a:solidFill>
+          </a:ln>
+        </p:spPr>
+        <p:style>
+          <a:lnRef idx="2">
+            <a:schemeClr val="accent1">
+              <a:shade val="50000"/>
+            </a:schemeClr>
+          </a:lnRef>
+          <a:fillRef idx="1">
+            <a:schemeClr val="accent1"/>
+          </a:fillRef>
+          <a:effectRef idx="0">
+            <a:schemeClr val="accent1"/>
+          </a:effectRef>
+          <a:fontRef idx="minor">
+            <a:schemeClr val="lt1"/>
+          </a:fontRef>
+        </p:style>
+        <p:txBody>
+          <a:bodyPr rtlCol="0" anchor="ctr"/>
+          <a:lstStyle/>
+          <a:p>
+            <a:pPr algn="ctr"/>
+            <a:endParaRPr kumimoji="1" lang="ja-JP" altLang="en-US"/>
+          </a:p>
+        </p:txBody>
+      </p:sp>
+      <p:sp>
+        <p:nvSpPr>
+          <p:cNvPr id="43" name="テキスト ボックス 42"/>
+          <p:cNvSpPr txBox="1"/>
+          <p:nvPr/>
+        </p:nvSpPr>
+        <p:spPr>
+          <a:xfrm>
+            <a:off x="5976745" y="3617659"/>
+            <a:ext cx="1035062" cy="646331"/>
+          </a:xfrm>
+          <a:prstGeom prst="rect">
+            <a:avLst/>
+          </a:prstGeom>
+          <a:noFill/>
+        </p:spPr>
+        <p:txBody>
+          <a:bodyPr wrap="square" rtlCol="0">
+            <a:spAutoFit/>
+          </a:bodyPr>
+          <a:lstStyle/>
+          <a:p>
+            <a:r>
+              <a:rPr kumimoji="1" lang="en-US" altLang="ja-JP" dirty="0" smtClean="0"/>
+              <a:t>Septum</a:t>
+            </a:r>
+            <a:r>
+              <a:rPr lang="ja-JP" altLang="en-US" dirty="0" smtClean="0"/>
+              <a:t> </a:t>
+            </a:r>
+            <a:r>
+              <a:rPr lang="en-US" altLang="ja-JP" dirty="0" smtClean="0"/>
+              <a:t>Magnet</a:t>
+            </a:r>
+            <a:endParaRPr kumimoji="1" lang="ja-JP" altLang="en-US" dirty="0"/>
+          </a:p>
+        </p:txBody>
+      </p:sp>
+    </p:spTree>
+    <p:extLst>
+      <p:ext uri="{BB962C8B-B14F-4D97-AF65-F5344CB8AC3E}">
+        <p14:creationId xmlns:p14="http://schemas.microsoft.com/office/powerpoint/2010/main" val="4007166605"/>
+      </p:ext>
+    </p:extLst>
+  </p:cSld>
+  <p:clrMapOvr>
+    <a:masterClrMapping/>
+  </p:clrMapOvr>
 </p:sld>
 </file>
 
@@ -36399,8 +38251,8 @@
           </mc:Fallback>
         </mc:AlternateContent>
       </p:grpSp>
-      <mc:AlternateContent xmlns:mc="http://schemas.openxmlformats.org/markup-compatibility/2006">
-        <mc:Choice xmlns:a14="http://schemas.microsoft.com/office/drawing/2010/main" Requires="a14">
+      <mc:AlternateContent xmlns:mc="http://schemas.openxmlformats.org/markup-compatibility/2006" xmlns:a14="http://schemas.microsoft.com/office/drawing/2010/main">
+        <mc:Choice Requires="a14">
           <p:sp>
             <p:nvSpPr>
               <p:cNvPr id="9" name="テキスト ボックス 8"/>
@@ -36487,7 +38339,7 @@
             </p:txBody>
           </p:sp>
         </mc:Choice>
-        <mc:Fallback>
+        <mc:Fallback xmlns="">
           <p:sp>
             <p:nvSpPr>
               <p:cNvPr id="9" name="テキスト ボックス 8"/>

</xml_diff>